<commit_message>
Site updated: 2023-10-18 01:07:56
</commit_message>
<xml_diff>
--- a/封面设计.pptx
+++ b/封面设计.pptx
@@ -8,7 +8,7 @@
     <p:sldId id="256" r:id="rId3"/>
     <p:sldId id="257" r:id="rId4"/>
     <p:sldId id="258" r:id="rId5"/>
-    <p:sldId id="264" r:id="rId6"/>
+    <p:sldId id="269" r:id="rId6"/>
     <p:sldId id="263" r:id="rId7"/>
     <p:sldId id="259" r:id="rId8"/>
     <p:sldId id="260" r:id="rId9"/>
@@ -4087,13 +4087,13 @@
       <p:grpSpPr/>
       <p:grpSp>
         <p:nvGrpSpPr>
-          <p:cNvPr id="8" name="组合 7"/>
+          <p:cNvPr id="6" name="组合 5"/>
           <p:cNvGrpSpPr/>
           <p:nvPr/>
         </p:nvGrpSpPr>
         <p:grpSpPr>
           <a:xfrm>
-            <a:off x="1929765" y="2027555"/>
+            <a:off x="1607185" y="1879600"/>
             <a:ext cx="6502400" cy="3779520"/>
             <a:chOff x="4480" y="2315"/>
             <a:chExt cx="10240" cy="5952"/>
@@ -4101,18 +4101,14 @@
         </p:grpSpPr>
         <p:pic>
           <p:nvPicPr>
-            <p:cNvPr id="9" name="图片 8" descr="VCG41165812532"/>
+            <p:cNvPr id="4" name="图片 3" descr="VCG41165812532"/>
             <p:cNvPicPr>
               <a:picLocks noChangeAspect="1"/>
             </p:cNvPicPr>
-            <p:nvPr>
-              <p:custDataLst>
-                <p:tags r:id="rId1"/>
-              </p:custDataLst>
-            </p:nvPr>
+            <p:nvPr/>
           </p:nvPicPr>
           <p:blipFill>
-            <a:blip r:embed="rId2"/>
+            <a:blip r:embed="rId1"/>
             <a:srcRect b="3533"/>
             <a:stretch>
               <a:fillRect/>
@@ -4130,18 +4126,14 @@
         </p:pic>
         <p:sp>
           <p:nvSpPr>
-            <p:cNvPr id="10" name="矩形 9"/>
+            <p:cNvPr id="5" name="矩形 4"/>
             <p:cNvSpPr/>
-            <p:nvPr>
-              <p:custDataLst>
-                <p:tags r:id="rId3"/>
-              </p:custDataLst>
-            </p:nvPr>
+            <p:nvPr/>
           </p:nvSpPr>
           <p:spPr>
             <a:xfrm>
-              <a:off x="7527" y="4014"/>
-              <a:ext cx="4146" cy="1016"/>
+              <a:off x="7785" y="3152"/>
+              <a:ext cx="3657" cy="2761"/>
             </a:xfrm>
             <a:prstGeom prst="rect">
               <a:avLst/>
@@ -4199,7 +4191,7 @@
                     </a:outerShdw>
                   </a:effectLst>
                 </a:rPr>
-                <a:t>  </a:t>
+                <a:t> </a:t>
               </a:r>
               <a:r>
                 <a:rPr lang="zh-CN" altLang="en-US" sz="3600" b="1">
@@ -4243,7 +4235,7 @@
                     </a:outerShdw>
                   </a:effectLst>
                 </a:rPr>
-                <a:t>  </a:t>
+                <a:t> </a:t>
               </a:r>
               <a:r>
                 <a:rPr lang="zh-CN" altLang="en-US" sz="3600" b="1">
@@ -4287,7 +4279,7 @@
                     </a:outerShdw>
                   </a:effectLst>
                 </a:rPr>
-                <a:t>  </a:t>
+                <a:t> </a:t>
               </a:r>
               <a:r>
                 <a:rPr lang="zh-CN" altLang="en-US" sz="3600" b="1">
@@ -4310,6 +4302,226 @@
                   </a:effectLst>
                 </a:rPr>
                 <a:t>数</a:t>
+              </a:r>
+              <a:endParaRPr lang="zh-CN" altLang="en-US" sz="3600" b="1">
+                <a:ln w="13462">
+                  <a:solidFill>
+                    <a:schemeClr val="bg1"/>
+                  </a:solidFill>
+                  <a:prstDash val="solid"/>
+                </a:ln>
+                <a:solidFill>
+                  <a:schemeClr val="tx1">
+                    <a:lumMod val="85000"/>
+                    <a:lumOff val="15000"/>
+                  </a:schemeClr>
+                </a:solidFill>
+                <a:effectLst>
+                  <a:outerShdw dist="38100" dir="2700000" algn="bl" rotWithShape="0">
+                    <a:schemeClr val="accent5"/>
+                  </a:outerShdw>
+                </a:effectLst>
+              </a:endParaRPr>
+            </a:p>
+            <a:p>
+              <a:pPr algn="ctr"/>
+              <a:r>
+                <a:rPr lang="zh-CN" altLang="en-US" sz="3600" b="1">
+                  <a:ln w="13462">
+                    <a:solidFill>
+                      <a:schemeClr val="bg1"/>
+                    </a:solidFill>
+                    <a:prstDash val="solid"/>
+                  </a:ln>
+                  <a:solidFill>
+                    <a:schemeClr val="tx1">
+                      <a:lumMod val="85000"/>
+                      <a:lumOff val="15000"/>
+                    </a:schemeClr>
+                  </a:solidFill>
+                  <a:effectLst>
+                    <a:outerShdw dist="38100" dir="2700000" algn="bl" rotWithShape="0">
+                      <a:schemeClr val="accent5"/>
+                    </a:outerShdw>
+                  </a:effectLst>
+                </a:rPr>
+                <a:t>与</a:t>
+              </a:r>
+              <a:endParaRPr lang="zh-CN" altLang="en-US" sz="3600" b="1">
+                <a:ln w="13462">
+                  <a:solidFill>
+                    <a:schemeClr val="bg1"/>
+                  </a:solidFill>
+                  <a:prstDash val="solid"/>
+                </a:ln>
+                <a:solidFill>
+                  <a:schemeClr val="tx1">
+                    <a:lumMod val="85000"/>
+                    <a:lumOff val="15000"/>
+                  </a:schemeClr>
+                </a:solidFill>
+                <a:effectLst>
+                  <a:outerShdw dist="38100" dir="2700000" algn="bl" rotWithShape="0">
+                    <a:schemeClr val="accent5"/>
+                  </a:outerShdw>
+                </a:effectLst>
+              </a:endParaRPr>
+            </a:p>
+            <a:p>
+              <a:pPr algn="ctr"/>
+              <a:r>
+                <a:rPr lang="zh-CN" altLang="en-US" sz="3600" b="1">
+                  <a:ln w="13462">
+                    <a:solidFill>
+                      <a:schemeClr val="bg1"/>
+                    </a:solidFill>
+                    <a:prstDash val="solid"/>
+                  </a:ln>
+                  <a:solidFill>
+                    <a:schemeClr val="tx1">
+                      <a:lumMod val="85000"/>
+                      <a:lumOff val="15000"/>
+                    </a:schemeClr>
+                  </a:solidFill>
+                  <a:effectLst>
+                    <a:outerShdw dist="38100" dir="2700000" algn="bl" rotWithShape="0">
+                      <a:schemeClr val="accent5"/>
+                    </a:outerShdw>
+                  </a:effectLst>
+                </a:rPr>
+                <a:t>回</a:t>
+              </a:r>
+              <a:r>
+                <a:rPr lang="en-US" altLang="zh-CN" sz="3600" b="1">
+                  <a:ln w="13462">
+                    <a:solidFill>
+                      <a:schemeClr val="bg1"/>
+                    </a:solidFill>
+                    <a:prstDash val="solid"/>
+                  </a:ln>
+                  <a:solidFill>
+                    <a:schemeClr val="tx1">
+                      <a:lumMod val="85000"/>
+                      <a:lumOff val="15000"/>
+                    </a:schemeClr>
+                  </a:solidFill>
+                  <a:effectLst>
+                    <a:outerShdw dist="38100" dir="2700000" algn="bl" rotWithShape="0">
+                      <a:schemeClr val="accent5"/>
+                    </a:outerShdw>
+                  </a:effectLst>
+                </a:rPr>
+                <a:t> </a:t>
+              </a:r>
+              <a:r>
+                <a:rPr lang="zh-CN" altLang="en-US" sz="3600" b="1">
+                  <a:ln w="13462">
+                    <a:solidFill>
+                      <a:schemeClr val="bg1"/>
+                    </a:solidFill>
+                    <a:prstDash val="solid"/>
+                  </a:ln>
+                  <a:solidFill>
+                    <a:schemeClr val="tx1">
+                      <a:lumMod val="85000"/>
+                      <a:lumOff val="15000"/>
+                    </a:schemeClr>
+                  </a:solidFill>
+                  <a:effectLst>
+                    <a:outerShdw dist="38100" dir="2700000" algn="bl" rotWithShape="0">
+                      <a:schemeClr val="accent5"/>
+                    </a:outerShdw>
+                  </a:effectLst>
+                </a:rPr>
+                <a:t>调</a:t>
+              </a:r>
+              <a:r>
+                <a:rPr lang="en-US" altLang="zh-CN" sz="3600" b="1">
+                  <a:ln w="13462">
+                    <a:solidFill>
+                      <a:schemeClr val="bg1"/>
+                    </a:solidFill>
+                    <a:prstDash val="solid"/>
+                  </a:ln>
+                  <a:solidFill>
+                    <a:schemeClr val="tx1">
+                      <a:lumMod val="85000"/>
+                      <a:lumOff val="15000"/>
+                    </a:schemeClr>
+                  </a:solidFill>
+                  <a:effectLst>
+                    <a:outerShdw dist="38100" dir="2700000" algn="bl" rotWithShape="0">
+                      <a:schemeClr val="accent5"/>
+                    </a:outerShdw>
+                  </a:effectLst>
+                </a:rPr>
+                <a:t> </a:t>
+              </a:r>
+              <a:r>
+                <a:rPr lang="zh-CN" altLang="en-US" sz="3600" b="1">
+                  <a:ln w="13462">
+                    <a:solidFill>
+                      <a:schemeClr val="bg1"/>
+                    </a:solidFill>
+                    <a:prstDash val="solid"/>
+                  </a:ln>
+                  <a:solidFill>
+                    <a:schemeClr val="tx1">
+                      <a:lumMod val="85000"/>
+                      <a:lumOff val="15000"/>
+                    </a:schemeClr>
+                  </a:solidFill>
+                  <a:effectLst>
+                    <a:outerShdw dist="38100" dir="2700000" algn="bl" rotWithShape="0">
+                      <a:schemeClr val="accent5"/>
+                    </a:outerShdw>
+                  </a:effectLst>
+                </a:rPr>
+                <a:t>地</a:t>
+              </a:r>
+              <a:r>
+                <a:rPr lang="en-US" altLang="zh-CN" sz="3600" b="1">
+                  <a:ln w="13462">
+                    <a:solidFill>
+                      <a:schemeClr val="bg1"/>
+                    </a:solidFill>
+                    <a:prstDash val="solid"/>
+                  </a:ln>
+                  <a:solidFill>
+                    <a:schemeClr val="tx1">
+                      <a:lumMod val="85000"/>
+                      <a:lumOff val="15000"/>
+                    </a:schemeClr>
+                  </a:solidFill>
+                  <a:effectLst>
+                    <a:outerShdw dist="38100" dir="2700000" algn="bl" rotWithShape="0">
+                      <a:schemeClr val="accent5"/>
+                    </a:outerShdw>
+                  </a:effectLst>
+                </a:rPr>
+                <a:t> </a:t>
+              </a:r>
+              <a:r>
+                <a:rPr lang="zh-CN" altLang="en-US" sz="3600" b="1">
+                  <a:ln w="13462">
+                    <a:solidFill>
+                      <a:schemeClr val="bg1"/>
+                    </a:solidFill>
+                    <a:prstDash val="solid"/>
+                  </a:ln>
+                  <a:solidFill>
+                    <a:schemeClr val="tx1">
+                      <a:lumMod val="85000"/>
+                      <a:lumOff val="15000"/>
+                    </a:schemeClr>
+                  </a:solidFill>
+                  <a:effectLst>
+                    <a:outerShdw dist="38100" dir="2700000" algn="bl" rotWithShape="0">
+                      <a:schemeClr val="accent5"/>
+                    </a:outerShdw>
+                  </a:effectLst>
+                </a:rPr>
+                <a:t>狱</a:t>
               </a:r>
               <a:endParaRPr lang="zh-CN" altLang="en-US" sz="3600" b="1">
                 <a:ln w="13462">
@@ -6003,18 +6215,6 @@
 </file>
 
 <file path=ppt/tags/tag7.xml><?xml version="1.0" encoding="utf-8"?>
-<p:tagLst xmlns:p="http://schemas.openxmlformats.org/presentationml/2006/main">
-  <p:tag name="KSO_WM_BEAUTIFY_FLAG" val=""/>
-</p:tagLst>
-</file>
-
-<file path=ppt/tags/tag8.xml><?xml version="1.0" encoding="utf-8"?>
-<p:tagLst xmlns:p="http://schemas.openxmlformats.org/presentationml/2006/main">
-  <p:tag name="KSO_WM_BEAUTIFY_FLAG" val=""/>
-</p:tagLst>
-</file>
-
-<file path=ppt/tags/tag9.xml><?xml version="1.0" encoding="utf-8"?>
 <p:tagLst xmlns:p="http://schemas.openxmlformats.org/presentationml/2006/main">
   <p:tag name="commondata" val="eyJoZGlkIjoiNmE4YWE2NWM2NjkyMzUxOGRkNDNkNjJlMmYxYjJlZDkifQ=="/>
 </p:tagLst>

</xml_diff>

<commit_message>
Site updated: 2023-10-27 11:14:37
</commit_message>
<xml_diff>
--- a/封面设计.pptx
+++ b/封面设计.pptx
@@ -13,11 +13,12 @@
     <p:sldId id="259" r:id="rId8"/>
     <p:sldId id="260" r:id="rId9"/>
     <p:sldId id="261" r:id="rId10"/>
+    <p:sldId id="274" r:id="rId11"/>
   </p:sldIdLst>
   <p:sldSz cx="12192000" cy="6858000"/>
   <p:notesSz cx="6858000" cy="9144000"/>
   <p:custDataLst>
-    <p:tags r:id="rId14"/>
+    <p:tags r:id="rId15"/>
   </p:custDataLst>
   <p:defaultTextStyle>
     <a:defPPr>
@@ -6178,6 +6179,441 @@
 </p:sld>
 </file>
 
+<file path=ppt/slides/slide9.xml><?xml version="1.0" encoding="utf-8"?>
+<p:sld xmlns:a="http://schemas.openxmlformats.org/drawingml/2006/main" xmlns:r="http://schemas.openxmlformats.org/officeDocument/2006/relationships" xmlns:p="http://schemas.openxmlformats.org/presentationml/2006/main">
+  <p:cSld>
+    <p:spTree>
+      <p:nvGrpSpPr>
+        <p:cNvPr id="1" name=""/>
+        <p:cNvGrpSpPr/>
+        <p:nvPr/>
+      </p:nvGrpSpPr>
+      <p:grpSpPr/>
+      <p:grpSp>
+        <p:nvGrpSpPr>
+          <p:cNvPr id="4" name="组合 3"/>
+          <p:cNvGrpSpPr/>
+          <p:nvPr/>
+        </p:nvGrpSpPr>
+        <p:grpSpPr>
+          <a:xfrm>
+            <a:off x="2443480" y="1238250"/>
+            <a:ext cx="6502400" cy="4067810"/>
+            <a:chOff x="4480" y="2196"/>
+            <a:chExt cx="10240" cy="6406"/>
+          </a:xfrm>
+        </p:grpSpPr>
+        <p:pic>
+          <p:nvPicPr>
+            <p:cNvPr id="2" name="图片 1" descr="VCG4197733799"/>
+            <p:cNvPicPr>
+              <a:picLocks noChangeAspect="1"/>
+            </p:cNvPicPr>
+            <p:nvPr/>
+          </p:nvPicPr>
+          <p:blipFill>
+            <a:blip r:embed="rId1"/>
+            <a:srcRect b="5779"/>
+            <a:stretch>
+              <a:fillRect/>
+            </a:stretch>
+          </p:blipFill>
+          <p:spPr>
+            <a:xfrm>
+              <a:off x="4480" y="2196"/>
+              <a:ext cx="10240" cy="6407"/>
+            </a:xfrm>
+            <a:prstGeom prst="rect">
+              <a:avLst/>
+            </a:prstGeom>
+          </p:spPr>
+        </p:pic>
+        <p:sp>
+          <p:nvSpPr>
+            <p:cNvPr id="3" name="矩形 2"/>
+            <p:cNvSpPr/>
+            <p:nvPr/>
+          </p:nvSpPr>
+          <p:spPr>
+            <a:xfrm>
+              <a:off x="6622" y="3583"/>
+              <a:ext cx="5956" cy="3633"/>
+            </a:xfrm>
+            <a:prstGeom prst="rect">
+              <a:avLst/>
+            </a:prstGeom>
+            <a:noFill/>
+            <a:ln>
+              <a:noFill/>
+            </a:ln>
+          </p:spPr>
+          <p:txBody>
+            <a:bodyPr wrap="none" rtlCol="0" anchor="t">
+              <a:spAutoFit/>
+            </a:bodyPr>
+            <a:p>
+              <a:pPr algn="ctr"/>
+              <a:r>
+                <a:rPr lang="zh-CN" altLang="en-US" sz="4800" b="1">
+                  <a:ln/>
+                  <a:solidFill>
+                    <a:schemeClr val="bg2"/>
+                  </a:solidFill>
+                  <a:effectLst>
+                    <a:innerShdw blurRad="63500" dist="50800" dir="13500000">
+                      <a:srgbClr val="000000">
+                        <a:alpha val="50000"/>
+                      </a:srgbClr>
+                    </a:innerShdw>
+                  </a:effectLst>
+                </a:rPr>
+                <a:t>时</a:t>
+              </a:r>
+              <a:r>
+                <a:rPr lang="en-US" altLang="zh-CN" sz="4800" b="1">
+                  <a:ln/>
+                  <a:solidFill>
+                    <a:schemeClr val="bg2"/>
+                  </a:solidFill>
+                  <a:effectLst>
+                    <a:innerShdw blurRad="63500" dist="50800" dir="13500000">
+                      <a:srgbClr val="000000">
+                        <a:alpha val="50000"/>
+                      </a:srgbClr>
+                    </a:innerShdw>
+                  </a:effectLst>
+                </a:rPr>
+                <a:t> </a:t>
+              </a:r>
+              <a:r>
+                <a:rPr lang="zh-CN" altLang="en-US" sz="4800" b="1">
+                  <a:ln/>
+                  <a:solidFill>
+                    <a:schemeClr val="bg2"/>
+                  </a:solidFill>
+                  <a:effectLst>
+                    <a:innerShdw blurRad="63500" dist="50800" dir="13500000">
+                      <a:srgbClr val="000000">
+                        <a:alpha val="50000"/>
+                      </a:srgbClr>
+                    </a:innerShdw>
+                  </a:effectLst>
+                </a:rPr>
+                <a:t>间</a:t>
+              </a:r>
+              <a:r>
+                <a:rPr lang="en-US" altLang="zh-CN" sz="4800" b="1">
+                  <a:ln/>
+                  <a:solidFill>
+                    <a:schemeClr val="bg2"/>
+                  </a:solidFill>
+                  <a:effectLst>
+                    <a:innerShdw blurRad="63500" dist="50800" dir="13500000">
+                      <a:srgbClr val="000000">
+                        <a:alpha val="50000"/>
+                      </a:srgbClr>
+                    </a:innerShdw>
+                  </a:effectLst>
+                </a:rPr>
+                <a:t> </a:t>
+              </a:r>
+              <a:r>
+                <a:rPr lang="zh-CN" altLang="en-US" sz="4800" b="1">
+                  <a:ln/>
+                  <a:solidFill>
+                    <a:schemeClr val="bg2"/>
+                  </a:solidFill>
+                  <a:effectLst>
+                    <a:innerShdw blurRad="63500" dist="50800" dir="13500000">
+                      <a:srgbClr val="000000">
+                        <a:alpha val="50000"/>
+                      </a:srgbClr>
+                    </a:innerShdw>
+                  </a:effectLst>
+                </a:rPr>
+                <a:t>复</a:t>
+              </a:r>
+              <a:r>
+                <a:rPr lang="en-US" altLang="zh-CN" sz="4800" b="1">
+                  <a:ln/>
+                  <a:solidFill>
+                    <a:schemeClr val="bg2"/>
+                  </a:solidFill>
+                  <a:effectLst>
+                    <a:innerShdw blurRad="63500" dist="50800" dir="13500000">
+                      <a:srgbClr val="000000">
+                        <a:alpha val="50000"/>
+                      </a:srgbClr>
+                    </a:innerShdw>
+                  </a:effectLst>
+                </a:rPr>
+                <a:t> </a:t>
+              </a:r>
+              <a:r>
+                <a:rPr lang="zh-CN" altLang="en-US" sz="4800" b="1">
+                  <a:ln/>
+                  <a:solidFill>
+                    <a:schemeClr val="bg2"/>
+                  </a:solidFill>
+                  <a:effectLst>
+                    <a:innerShdw blurRad="63500" dist="50800" dir="13500000">
+                      <a:srgbClr val="000000">
+                        <a:alpha val="50000"/>
+                      </a:srgbClr>
+                    </a:innerShdw>
+                  </a:effectLst>
+                </a:rPr>
+                <a:t>杂</a:t>
+              </a:r>
+              <a:r>
+                <a:rPr lang="en-US" altLang="zh-CN" sz="4800" b="1">
+                  <a:ln/>
+                  <a:solidFill>
+                    <a:schemeClr val="bg2"/>
+                  </a:solidFill>
+                  <a:effectLst>
+                    <a:innerShdw blurRad="63500" dist="50800" dir="13500000">
+                      <a:srgbClr val="000000">
+                        <a:alpha val="50000"/>
+                      </a:srgbClr>
+                    </a:innerShdw>
+                  </a:effectLst>
+                </a:rPr>
+                <a:t> </a:t>
+              </a:r>
+              <a:r>
+                <a:rPr lang="zh-CN" altLang="en-US" sz="4800" b="1">
+                  <a:ln/>
+                  <a:solidFill>
+                    <a:schemeClr val="bg2"/>
+                  </a:solidFill>
+                  <a:effectLst>
+                    <a:innerShdw blurRad="63500" dist="50800" dir="13500000">
+                      <a:srgbClr val="000000">
+                        <a:alpha val="50000"/>
+                      </a:srgbClr>
+                    </a:innerShdw>
+                  </a:effectLst>
+                </a:rPr>
+                <a:t>度</a:t>
+              </a:r>
+              <a:endParaRPr lang="zh-CN" altLang="en-US" sz="4800" b="1">
+                <a:ln/>
+                <a:solidFill>
+                  <a:schemeClr val="bg2"/>
+                </a:solidFill>
+                <a:effectLst>
+                  <a:innerShdw blurRad="63500" dist="50800" dir="13500000">
+                    <a:srgbClr val="000000">
+                      <a:alpha val="50000"/>
+                    </a:srgbClr>
+                  </a:innerShdw>
+                </a:effectLst>
+              </a:endParaRPr>
+            </a:p>
+            <a:p>
+              <a:pPr algn="ctr"/>
+              <a:r>
+                <a:rPr lang="zh-CN" altLang="en-US" sz="4800" b="1">
+                  <a:ln/>
+                  <a:solidFill>
+                    <a:schemeClr val="bg2"/>
+                  </a:solidFill>
+                  <a:effectLst>
+                    <a:innerShdw blurRad="63500" dist="50800" dir="13500000">
+                      <a:srgbClr val="000000">
+                        <a:alpha val="50000"/>
+                      </a:srgbClr>
+                    </a:innerShdw>
+                  </a:effectLst>
+                </a:rPr>
+                <a:t>与</a:t>
+              </a:r>
+              <a:endParaRPr lang="zh-CN" altLang="en-US" sz="4800" b="1">
+                <a:ln/>
+                <a:solidFill>
+                  <a:schemeClr val="bg2"/>
+                </a:solidFill>
+                <a:effectLst>
+                  <a:innerShdw blurRad="63500" dist="50800" dir="13500000">
+                    <a:srgbClr val="000000">
+                      <a:alpha val="50000"/>
+                    </a:srgbClr>
+                  </a:innerShdw>
+                </a:effectLst>
+              </a:endParaRPr>
+            </a:p>
+            <a:p>
+              <a:pPr algn="ctr"/>
+              <a:r>
+                <a:rPr lang="zh-CN" altLang="en-US" sz="4800" b="1">
+                  <a:ln/>
+                  <a:solidFill>
+                    <a:schemeClr val="bg2"/>
+                  </a:solidFill>
+                  <a:effectLst>
+                    <a:innerShdw blurRad="63500" dist="50800" dir="13500000">
+                      <a:srgbClr val="000000">
+                        <a:alpha val="50000"/>
+                      </a:srgbClr>
+                    </a:innerShdw>
+                  </a:effectLst>
+                </a:rPr>
+                <a:t>空</a:t>
+              </a:r>
+              <a:r>
+                <a:rPr lang="en-US" altLang="zh-CN" sz="4800" b="1">
+                  <a:ln/>
+                  <a:solidFill>
+                    <a:schemeClr val="bg2"/>
+                  </a:solidFill>
+                  <a:effectLst>
+                    <a:innerShdw blurRad="63500" dist="50800" dir="13500000">
+                      <a:srgbClr val="000000">
+                        <a:alpha val="50000"/>
+                      </a:srgbClr>
+                    </a:innerShdw>
+                  </a:effectLst>
+                </a:rPr>
+                <a:t> </a:t>
+              </a:r>
+              <a:r>
+                <a:rPr lang="zh-CN" altLang="en-US" sz="4800" b="1">
+                  <a:ln/>
+                  <a:solidFill>
+                    <a:schemeClr val="bg2"/>
+                  </a:solidFill>
+                  <a:effectLst>
+                    <a:innerShdw blurRad="63500" dist="50800" dir="13500000">
+                      <a:srgbClr val="000000">
+                        <a:alpha val="50000"/>
+                      </a:srgbClr>
+                    </a:innerShdw>
+                  </a:effectLst>
+                </a:rPr>
+                <a:t>间</a:t>
+              </a:r>
+              <a:r>
+                <a:rPr lang="en-US" altLang="zh-CN" sz="4800" b="1">
+                  <a:ln/>
+                  <a:solidFill>
+                    <a:schemeClr val="bg2"/>
+                  </a:solidFill>
+                  <a:effectLst>
+                    <a:innerShdw blurRad="63500" dist="50800" dir="13500000">
+                      <a:srgbClr val="000000">
+                        <a:alpha val="50000"/>
+                      </a:srgbClr>
+                    </a:innerShdw>
+                  </a:effectLst>
+                </a:rPr>
+                <a:t> </a:t>
+              </a:r>
+              <a:r>
+                <a:rPr lang="zh-CN" altLang="en-US" sz="4800" b="1">
+                  <a:ln/>
+                  <a:solidFill>
+                    <a:schemeClr val="bg2"/>
+                  </a:solidFill>
+                  <a:effectLst>
+                    <a:innerShdw blurRad="63500" dist="50800" dir="13500000">
+                      <a:srgbClr val="000000">
+                        <a:alpha val="50000"/>
+                      </a:srgbClr>
+                    </a:innerShdw>
+                  </a:effectLst>
+                </a:rPr>
+                <a:t>复</a:t>
+              </a:r>
+              <a:r>
+                <a:rPr lang="en-US" altLang="zh-CN" sz="4800" b="1">
+                  <a:ln/>
+                  <a:solidFill>
+                    <a:schemeClr val="bg2"/>
+                  </a:solidFill>
+                  <a:effectLst>
+                    <a:innerShdw blurRad="63500" dist="50800" dir="13500000">
+                      <a:srgbClr val="000000">
+                        <a:alpha val="50000"/>
+                      </a:srgbClr>
+                    </a:innerShdw>
+                  </a:effectLst>
+                </a:rPr>
+                <a:t> </a:t>
+              </a:r>
+              <a:r>
+                <a:rPr lang="zh-CN" altLang="en-US" sz="4800" b="1">
+                  <a:ln/>
+                  <a:solidFill>
+                    <a:schemeClr val="bg2"/>
+                  </a:solidFill>
+                  <a:effectLst>
+                    <a:innerShdw blurRad="63500" dist="50800" dir="13500000">
+                      <a:srgbClr val="000000">
+                        <a:alpha val="50000"/>
+                      </a:srgbClr>
+                    </a:innerShdw>
+                  </a:effectLst>
+                </a:rPr>
+                <a:t>杂</a:t>
+              </a:r>
+              <a:r>
+                <a:rPr lang="en-US" altLang="zh-CN" sz="4800" b="1">
+                  <a:ln/>
+                  <a:solidFill>
+                    <a:schemeClr val="bg2"/>
+                  </a:solidFill>
+                  <a:effectLst>
+                    <a:innerShdw blurRad="63500" dist="50800" dir="13500000">
+                      <a:srgbClr val="000000">
+                        <a:alpha val="50000"/>
+                      </a:srgbClr>
+                    </a:innerShdw>
+                  </a:effectLst>
+                </a:rPr>
+                <a:t> </a:t>
+              </a:r>
+              <a:r>
+                <a:rPr lang="zh-CN" altLang="en-US" sz="4800" b="1">
+                  <a:ln/>
+                  <a:solidFill>
+                    <a:schemeClr val="bg2"/>
+                  </a:solidFill>
+                  <a:effectLst>
+                    <a:innerShdw blurRad="63500" dist="50800" dir="13500000">
+                      <a:srgbClr val="000000">
+                        <a:alpha val="50000"/>
+                      </a:srgbClr>
+                    </a:innerShdw>
+                  </a:effectLst>
+                </a:rPr>
+                <a:t>度</a:t>
+              </a:r>
+              <a:endParaRPr lang="zh-CN" altLang="en-US" sz="4800" b="1">
+                <a:ln/>
+                <a:solidFill>
+                  <a:schemeClr val="bg2"/>
+                </a:solidFill>
+                <a:effectLst>
+                  <a:innerShdw blurRad="63500" dist="50800" dir="13500000">
+                    <a:srgbClr val="000000">
+                      <a:alpha val="50000"/>
+                    </a:srgbClr>
+                  </a:innerShdw>
+                </a:effectLst>
+              </a:endParaRPr>
+            </a:p>
+          </p:txBody>
+        </p:sp>
+      </p:grpSp>
+    </p:spTree>
+  </p:cSld>
+  <p:clrMapOvr>
+    <a:masterClrMapping/>
+  </p:clrMapOvr>
+</p:sld>
+</file>
+
 <file path=ppt/tags/tag1.xml><?xml version="1.0" encoding="utf-8"?>
 <p:tagLst xmlns:p="http://schemas.openxmlformats.org/presentationml/2006/main">
   <p:tag name="KSO_WM_BEAUTIFY_FLAG" val=""/>

</xml_diff>

<commit_message>
Site updated: 2023-10-27 14:32:15
</commit_message>
<xml_diff>
--- a/封面设计.pptx
+++ b/封面设计.pptx
@@ -14,11 +14,13 @@
     <p:sldId id="260" r:id="rId9"/>
     <p:sldId id="261" r:id="rId10"/>
     <p:sldId id="274" r:id="rId11"/>
+    <p:sldId id="275" r:id="rId12"/>
+    <p:sldId id="276" r:id="rId13"/>
   </p:sldIdLst>
   <p:sldSz cx="12192000" cy="6858000"/>
   <p:notesSz cx="6858000" cy="9144000"/>
   <p:custDataLst>
-    <p:tags r:id="rId15"/>
+    <p:tags r:id="rId17"/>
   </p:custDataLst>
   <p:defaultTextStyle>
     <a:defPPr>
@@ -3226,6 +3228,630 @@
 </p:sld>
 </file>
 
+<file path=ppt/slides/slide10.xml><?xml version="1.0" encoding="utf-8"?>
+<p:sld xmlns:a="http://schemas.openxmlformats.org/drawingml/2006/main" xmlns:r="http://schemas.openxmlformats.org/officeDocument/2006/relationships" xmlns:p="http://schemas.openxmlformats.org/presentationml/2006/main">
+  <p:cSld>
+    <p:spTree>
+      <p:nvGrpSpPr>
+        <p:cNvPr id="1" name=""/>
+        <p:cNvGrpSpPr/>
+        <p:nvPr/>
+      </p:nvGrpSpPr>
+      <p:grpSpPr/>
+      <p:grpSp>
+        <p:nvGrpSpPr>
+          <p:cNvPr id="9" name="组合 8"/>
+          <p:cNvGrpSpPr/>
+          <p:nvPr/>
+        </p:nvGrpSpPr>
+        <p:grpSpPr>
+          <a:xfrm>
+            <a:off x="2528570" y="1068705"/>
+            <a:ext cx="6502400" cy="4743450"/>
+            <a:chOff x="3643" y="1356"/>
+            <a:chExt cx="10240" cy="7470"/>
+          </a:xfrm>
+        </p:grpSpPr>
+        <p:grpSp>
+          <p:nvGrpSpPr>
+            <p:cNvPr id="7" name="组合 6"/>
+            <p:cNvGrpSpPr/>
+            <p:nvPr/>
+          </p:nvGrpSpPr>
+          <p:grpSpPr>
+            <a:xfrm>
+              <a:off x="3643" y="1356"/>
+              <a:ext cx="10240" cy="7470"/>
+              <a:chOff x="3643" y="1356"/>
+              <a:chExt cx="10240" cy="7470"/>
+            </a:xfrm>
+          </p:grpSpPr>
+          <p:pic>
+            <p:nvPicPr>
+              <p:cNvPr id="5" name="图片 4" descr="VCG211237587387"/>
+              <p:cNvPicPr>
+                <a:picLocks noChangeAspect="1"/>
+              </p:cNvPicPr>
+              <p:nvPr/>
+            </p:nvPicPr>
+            <p:blipFill>
+              <a:blip r:embed="rId1"/>
+              <a:stretch>
+                <a:fillRect/>
+              </a:stretch>
+            </p:blipFill>
+            <p:spPr>
+              <a:xfrm>
+                <a:off x="3643" y="1356"/>
+                <a:ext cx="10240" cy="7470"/>
+              </a:xfrm>
+              <a:prstGeom prst="rect">
+                <a:avLst/>
+              </a:prstGeom>
+            </p:spPr>
+          </p:pic>
+          <p:pic>
+            <p:nvPicPr>
+              <p:cNvPr id="6" name="图片 5" descr="VCG211237587387"/>
+              <p:cNvPicPr>
+                <a:picLocks noChangeAspect="1"/>
+              </p:cNvPicPr>
+              <p:nvPr>
+                <p:custDataLst>
+                  <p:tags r:id="rId2"/>
+                </p:custDataLst>
+              </p:nvPr>
+            </p:nvPicPr>
+            <p:blipFill>
+              <a:blip r:embed="rId1"/>
+              <a:srcRect l="13301" t="1513" r="5049" b="87015"/>
+              <a:stretch>
+                <a:fillRect/>
+              </a:stretch>
+            </p:blipFill>
+            <p:spPr>
+              <a:xfrm>
+                <a:off x="5272" y="2446"/>
+                <a:ext cx="8361" cy="857"/>
+              </a:xfrm>
+              <a:prstGeom prst="rect">
+                <a:avLst/>
+              </a:prstGeom>
+            </p:spPr>
+          </p:pic>
+        </p:grpSp>
+        <p:sp>
+          <p:nvSpPr>
+            <p:cNvPr id="8" name="矩形 7"/>
+            <p:cNvSpPr/>
+            <p:nvPr/>
+          </p:nvSpPr>
+          <p:spPr>
+            <a:xfrm>
+              <a:off x="5723" y="2221"/>
+              <a:ext cx="6081" cy="1307"/>
+            </a:xfrm>
+            <a:prstGeom prst="rect">
+              <a:avLst/>
+            </a:prstGeom>
+            <a:noFill/>
+            <a:ln>
+              <a:noFill/>
+            </a:ln>
+          </p:spPr>
+          <p:txBody>
+            <a:bodyPr wrap="none" rtlCol="0" anchor="t">
+              <a:spAutoFit/>
+            </a:bodyPr>
+            <a:p>
+              <a:pPr algn="ctr"/>
+              <a:r>
+                <a:rPr lang="zh-CN" altLang="en-US" sz="4800" b="1">
+                  <a:ln w="10160">
+                    <a:solidFill>
+                      <a:schemeClr val="accent5"/>
+                    </a:solidFill>
+                    <a:prstDash val="solid"/>
+                  </a:ln>
+                  <a:solidFill>
+                    <a:srgbClr val="FFFFFF"/>
+                  </a:solidFill>
+                  <a:effectLst>
+                    <a:outerShdw blurRad="38100" dist="22860" dir="5400000" algn="tl" rotWithShape="0">
+                      <a:srgbClr val="000000">
+                        <a:alpha val="30000"/>
+                      </a:srgbClr>
+                    </a:outerShdw>
+                  </a:effectLst>
+                </a:rPr>
+                <a:t>数</a:t>
+              </a:r>
+              <a:r>
+                <a:rPr lang="en-US" altLang="zh-CN" sz="4800" b="1">
+                  <a:ln w="10160">
+                    <a:solidFill>
+                      <a:schemeClr val="accent5"/>
+                    </a:solidFill>
+                    <a:prstDash val="solid"/>
+                  </a:ln>
+                  <a:solidFill>
+                    <a:srgbClr val="FFFFFF"/>
+                  </a:solidFill>
+                  <a:effectLst>
+                    <a:outerShdw blurRad="38100" dist="22860" dir="5400000" algn="tl" rotWithShape="0">
+                      <a:srgbClr val="000000">
+                        <a:alpha val="30000"/>
+                      </a:srgbClr>
+                    </a:outerShdw>
+                  </a:effectLst>
+                </a:rPr>
+                <a:t>   </a:t>
+              </a:r>
+              <a:r>
+                <a:rPr lang="zh-CN" altLang="en-US" sz="4800" b="1">
+                  <a:ln w="10160">
+                    <a:solidFill>
+                      <a:schemeClr val="accent5"/>
+                    </a:solidFill>
+                    <a:prstDash val="solid"/>
+                  </a:ln>
+                  <a:solidFill>
+                    <a:srgbClr val="FFFFFF"/>
+                  </a:solidFill>
+                  <a:effectLst>
+                    <a:outerShdw blurRad="38100" dist="22860" dir="5400000" algn="tl" rotWithShape="0">
+                      <a:srgbClr val="000000">
+                        <a:alpha val="30000"/>
+                      </a:srgbClr>
+                    </a:outerShdw>
+                  </a:effectLst>
+                </a:rPr>
+                <a:t>据</a:t>
+              </a:r>
+              <a:r>
+                <a:rPr lang="en-US" altLang="zh-CN" sz="4800" b="1">
+                  <a:ln w="10160">
+                    <a:solidFill>
+                      <a:schemeClr val="accent5"/>
+                    </a:solidFill>
+                    <a:prstDash val="solid"/>
+                  </a:ln>
+                  <a:solidFill>
+                    <a:srgbClr val="FFFFFF"/>
+                  </a:solidFill>
+                  <a:effectLst>
+                    <a:outerShdw blurRad="38100" dist="22860" dir="5400000" algn="tl" rotWithShape="0">
+                      <a:srgbClr val="000000">
+                        <a:alpha val="30000"/>
+                      </a:srgbClr>
+                    </a:outerShdw>
+                  </a:effectLst>
+                </a:rPr>
+                <a:t>   </a:t>
+              </a:r>
+              <a:r>
+                <a:rPr lang="zh-CN" altLang="en-US" sz="4800" b="1">
+                  <a:ln w="10160">
+                    <a:solidFill>
+                      <a:schemeClr val="accent5"/>
+                    </a:solidFill>
+                    <a:prstDash val="solid"/>
+                  </a:ln>
+                  <a:solidFill>
+                    <a:srgbClr val="FFFFFF"/>
+                  </a:solidFill>
+                  <a:effectLst>
+                    <a:outerShdw blurRad="38100" dist="22860" dir="5400000" algn="tl" rotWithShape="0">
+                      <a:srgbClr val="000000">
+                        <a:alpha val="30000"/>
+                      </a:srgbClr>
+                    </a:outerShdw>
+                  </a:effectLst>
+                </a:rPr>
+                <a:t>结</a:t>
+              </a:r>
+              <a:r>
+                <a:rPr lang="en-US" altLang="zh-CN" sz="4800" b="1">
+                  <a:ln w="10160">
+                    <a:solidFill>
+                      <a:schemeClr val="accent5"/>
+                    </a:solidFill>
+                    <a:prstDash val="solid"/>
+                  </a:ln>
+                  <a:solidFill>
+                    <a:srgbClr val="FFFFFF"/>
+                  </a:solidFill>
+                  <a:effectLst>
+                    <a:outerShdw blurRad="38100" dist="22860" dir="5400000" algn="tl" rotWithShape="0">
+                      <a:srgbClr val="000000">
+                        <a:alpha val="30000"/>
+                      </a:srgbClr>
+                    </a:outerShdw>
+                  </a:effectLst>
+                </a:rPr>
+                <a:t>   </a:t>
+              </a:r>
+              <a:r>
+                <a:rPr lang="zh-CN" altLang="en-US" sz="4800" b="1">
+                  <a:ln w="10160">
+                    <a:solidFill>
+                      <a:schemeClr val="accent5"/>
+                    </a:solidFill>
+                    <a:prstDash val="solid"/>
+                  </a:ln>
+                  <a:solidFill>
+                    <a:srgbClr val="FFFFFF"/>
+                  </a:solidFill>
+                  <a:effectLst>
+                    <a:outerShdw blurRad="38100" dist="22860" dir="5400000" algn="tl" rotWithShape="0">
+                      <a:srgbClr val="000000">
+                        <a:alpha val="30000"/>
+                      </a:srgbClr>
+                    </a:outerShdw>
+                  </a:effectLst>
+                </a:rPr>
+                <a:t>构</a:t>
+              </a:r>
+              <a:endParaRPr lang="zh-CN" altLang="en-US" sz="4800" b="1">
+                <a:ln w="10160">
+                  <a:solidFill>
+                    <a:schemeClr val="accent5"/>
+                  </a:solidFill>
+                  <a:prstDash val="solid"/>
+                </a:ln>
+                <a:solidFill>
+                  <a:srgbClr val="FFFFFF"/>
+                </a:solidFill>
+                <a:effectLst>
+                  <a:outerShdw blurRad="38100" dist="22860" dir="5400000" algn="tl" rotWithShape="0">
+                    <a:srgbClr val="000000">
+                      <a:alpha val="30000"/>
+                    </a:srgbClr>
+                  </a:outerShdw>
+                </a:effectLst>
+              </a:endParaRPr>
+            </a:p>
+          </p:txBody>
+        </p:sp>
+      </p:grpSp>
+    </p:spTree>
+  </p:cSld>
+  <p:clrMapOvr>
+    <a:masterClrMapping/>
+  </p:clrMapOvr>
+</p:sld>
+</file>
+
+<file path=ppt/slides/slide11.xml><?xml version="1.0" encoding="utf-8"?>
+<p:sld xmlns:a="http://schemas.openxmlformats.org/drawingml/2006/main" xmlns:r="http://schemas.openxmlformats.org/officeDocument/2006/relationships" xmlns:p="http://schemas.openxmlformats.org/presentationml/2006/main">
+  <p:cSld>
+    <p:spTree>
+      <p:nvGrpSpPr>
+        <p:cNvPr id="1" name=""/>
+        <p:cNvGrpSpPr/>
+        <p:nvPr/>
+      </p:nvGrpSpPr>
+      <p:grpSpPr/>
+      <p:grpSp>
+        <p:nvGrpSpPr>
+          <p:cNvPr id="4" name="组合 3"/>
+          <p:cNvGrpSpPr/>
+          <p:nvPr/>
+        </p:nvGrpSpPr>
+        <p:grpSpPr>
+          <a:xfrm>
+            <a:off x="803275" y="76200"/>
+            <a:ext cx="9753600" cy="6705600"/>
+            <a:chOff x="1920" y="120"/>
+            <a:chExt cx="15360" cy="10560"/>
+          </a:xfrm>
+        </p:grpSpPr>
+        <p:pic>
+          <p:nvPicPr>
+            <p:cNvPr id="2" name="图片 1" descr="VCG211326845928"/>
+            <p:cNvPicPr>
+              <a:picLocks noChangeAspect="1"/>
+            </p:cNvPicPr>
+            <p:nvPr/>
+          </p:nvPicPr>
+          <p:blipFill>
+            <a:blip r:embed="rId1"/>
+            <a:stretch>
+              <a:fillRect/>
+            </a:stretch>
+          </p:blipFill>
+          <p:spPr>
+            <a:xfrm>
+              <a:off x="1920" y="120"/>
+              <a:ext cx="15360" cy="10560"/>
+            </a:xfrm>
+            <a:prstGeom prst="rect">
+              <a:avLst/>
+            </a:prstGeom>
+          </p:spPr>
+        </p:pic>
+        <p:sp>
+          <p:nvSpPr>
+            <p:cNvPr id="3" name="矩形 2"/>
+            <p:cNvSpPr/>
+            <p:nvPr/>
+          </p:nvSpPr>
+          <p:spPr>
+            <a:xfrm rot="20160000">
+              <a:off x="2642" y="2337"/>
+              <a:ext cx="5901" cy="1598"/>
+            </a:xfrm>
+            <a:prstGeom prst="rect">
+              <a:avLst/>
+            </a:prstGeom>
+            <a:noFill/>
+            <a:ln>
+              <a:noFill/>
+            </a:ln>
+          </p:spPr>
+          <p:txBody>
+            <a:bodyPr wrap="none" rtlCol="0" anchor="t">
+              <a:spAutoFit/>
+            </a:bodyPr>
+            <a:p>
+              <a:pPr algn="ctr"/>
+              <a:r>
+                <a:rPr lang="zh-CN" altLang="en-US" sz="6000" b="1">
+                  <a:ln w="12700">
+                    <a:solidFill>
+                      <a:schemeClr val="accent3">
+                        <a:lumMod val="50000"/>
+                      </a:schemeClr>
+                    </a:solidFill>
+                    <a:prstDash val="solid"/>
+                  </a:ln>
+                  <a:pattFill prst="narHorz">
+                    <a:fgClr>
+                      <a:schemeClr val="accent3"/>
+                    </a:fgClr>
+                    <a:bgClr>
+                      <a:schemeClr val="accent3">
+                        <a:lumMod val="40000"/>
+                        <a:lumOff val="60000"/>
+                      </a:schemeClr>
+                    </a:bgClr>
+                  </a:pattFill>
+                  <a:effectLst>
+                    <a:innerShdw blurRad="177800">
+                      <a:schemeClr val="accent3">
+                        <a:lumMod val="50000"/>
+                      </a:schemeClr>
+                    </a:innerShdw>
+                  </a:effectLst>
+                </a:rPr>
+                <a:t>前</a:t>
+              </a:r>
+              <a:r>
+                <a:rPr lang="en-US" altLang="zh-CN" sz="6000" b="1">
+                  <a:ln w="12700">
+                    <a:solidFill>
+                      <a:schemeClr val="accent3">
+                        <a:lumMod val="50000"/>
+                      </a:schemeClr>
+                    </a:solidFill>
+                    <a:prstDash val="solid"/>
+                  </a:ln>
+                  <a:pattFill prst="narHorz">
+                    <a:fgClr>
+                      <a:schemeClr val="accent3"/>
+                    </a:fgClr>
+                    <a:bgClr>
+                      <a:schemeClr val="accent3">
+                        <a:lumMod val="40000"/>
+                        <a:lumOff val="60000"/>
+                      </a:schemeClr>
+                    </a:bgClr>
+                  </a:pattFill>
+                  <a:effectLst>
+                    <a:innerShdw blurRad="177800">
+                      <a:schemeClr val="accent3">
+                        <a:lumMod val="50000"/>
+                      </a:schemeClr>
+                    </a:innerShdw>
+                  </a:effectLst>
+                </a:rPr>
+                <a:t> </a:t>
+              </a:r>
+              <a:r>
+                <a:rPr lang="zh-CN" altLang="en-US" sz="6000" b="1">
+                  <a:ln w="12700">
+                    <a:solidFill>
+                      <a:schemeClr val="accent3">
+                        <a:lumMod val="50000"/>
+                      </a:schemeClr>
+                    </a:solidFill>
+                    <a:prstDash val="solid"/>
+                  </a:ln>
+                  <a:pattFill prst="narHorz">
+                    <a:fgClr>
+                      <a:schemeClr val="accent3"/>
+                    </a:fgClr>
+                    <a:bgClr>
+                      <a:schemeClr val="accent3">
+                        <a:lumMod val="40000"/>
+                        <a:lumOff val="60000"/>
+                      </a:schemeClr>
+                    </a:bgClr>
+                  </a:pattFill>
+                  <a:effectLst>
+                    <a:innerShdw blurRad="177800">
+                      <a:schemeClr val="accent3">
+                        <a:lumMod val="50000"/>
+                      </a:schemeClr>
+                    </a:innerShdw>
+                  </a:effectLst>
+                </a:rPr>
+                <a:t>端</a:t>
+              </a:r>
+              <a:r>
+                <a:rPr lang="en-US" altLang="zh-CN" sz="6000" b="1">
+                  <a:ln w="12700">
+                    <a:solidFill>
+                      <a:schemeClr val="accent3">
+                        <a:lumMod val="50000"/>
+                      </a:schemeClr>
+                    </a:solidFill>
+                    <a:prstDash val="solid"/>
+                  </a:ln>
+                  <a:pattFill prst="narHorz">
+                    <a:fgClr>
+                      <a:schemeClr val="accent3"/>
+                    </a:fgClr>
+                    <a:bgClr>
+                      <a:schemeClr val="accent3">
+                        <a:lumMod val="40000"/>
+                        <a:lumOff val="60000"/>
+                      </a:schemeClr>
+                    </a:bgClr>
+                  </a:pattFill>
+                  <a:effectLst>
+                    <a:innerShdw blurRad="177800">
+                      <a:schemeClr val="accent3">
+                        <a:lumMod val="50000"/>
+                      </a:schemeClr>
+                    </a:innerShdw>
+                  </a:effectLst>
+                </a:rPr>
+                <a:t> </a:t>
+              </a:r>
+              <a:r>
+                <a:rPr lang="zh-CN" altLang="en-US" sz="6000" b="1">
+                  <a:ln w="12700">
+                    <a:solidFill>
+                      <a:schemeClr val="accent3">
+                        <a:lumMod val="50000"/>
+                      </a:schemeClr>
+                    </a:solidFill>
+                    <a:prstDash val="solid"/>
+                  </a:ln>
+                  <a:pattFill prst="narHorz">
+                    <a:fgClr>
+                      <a:schemeClr val="accent3"/>
+                    </a:fgClr>
+                    <a:bgClr>
+                      <a:schemeClr val="accent3">
+                        <a:lumMod val="40000"/>
+                        <a:lumOff val="60000"/>
+                      </a:schemeClr>
+                    </a:bgClr>
+                  </a:pattFill>
+                  <a:effectLst>
+                    <a:innerShdw blurRad="177800">
+                      <a:schemeClr val="accent3">
+                        <a:lumMod val="50000"/>
+                      </a:schemeClr>
+                    </a:innerShdw>
+                  </a:effectLst>
+                </a:rPr>
+                <a:t>进</a:t>
+              </a:r>
+              <a:r>
+                <a:rPr lang="en-US" altLang="zh-CN" sz="6000" b="1">
+                  <a:ln w="12700">
+                    <a:solidFill>
+                      <a:schemeClr val="accent3">
+                        <a:lumMod val="50000"/>
+                      </a:schemeClr>
+                    </a:solidFill>
+                    <a:prstDash val="solid"/>
+                  </a:ln>
+                  <a:pattFill prst="narHorz">
+                    <a:fgClr>
+                      <a:schemeClr val="accent3"/>
+                    </a:fgClr>
+                    <a:bgClr>
+                      <a:schemeClr val="accent3">
+                        <a:lumMod val="40000"/>
+                        <a:lumOff val="60000"/>
+                      </a:schemeClr>
+                    </a:bgClr>
+                  </a:pattFill>
+                  <a:effectLst>
+                    <a:innerShdw blurRad="177800">
+                      <a:schemeClr val="accent3">
+                        <a:lumMod val="50000"/>
+                      </a:schemeClr>
+                    </a:innerShdw>
+                  </a:effectLst>
+                </a:rPr>
+                <a:t> </a:t>
+              </a:r>
+              <a:r>
+                <a:rPr lang="zh-CN" altLang="en-US" sz="6000" b="1">
+                  <a:ln w="12700">
+                    <a:solidFill>
+                      <a:schemeClr val="accent3">
+                        <a:lumMod val="50000"/>
+                      </a:schemeClr>
+                    </a:solidFill>
+                    <a:prstDash val="solid"/>
+                  </a:ln>
+                  <a:pattFill prst="narHorz">
+                    <a:fgClr>
+                      <a:schemeClr val="accent3"/>
+                    </a:fgClr>
+                    <a:bgClr>
+                      <a:schemeClr val="accent3">
+                        <a:lumMod val="40000"/>
+                        <a:lumOff val="60000"/>
+                      </a:schemeClr>
+                    </a:bgClr>
+                  </a:pattFill>
+                  <a:effectLst>
+                    <a:innerShdw blurRad="177800">
+                      <a:schemeClr val="accent3">
+                        <a:lumMod val="50000"/>
+                      </a:schemeClr>
+                    </a:innerShdw>
+                  </a:effectLst>
+                </a:rPr>
+                <a:t>阶</a:t>
+              </a:r>
+              <a:endParaRPr lang="zh-CN" altLang="en-US" sz="6000" b="1">
+                <a:ln w="12700">
+                  <a:solidFill>
+                    <a:schemeClr val="accent3">
+                      <a:lumMod val="50000"/>
+                    </a:schemeClr>
+                  </a:solidFill>
+                  <a:prstDash val="solid"/>
+                </a:ln>
+                <a:pattFill prst="narHorz">
+                  <a:fgClr>
+                    <a:schemeClr val="accent3"/>
+                  </a:fgClr>
+                  <a:bgClr>
+                    <a:schemeClr val="accent3">
+                      <a:lumMod val="40000"/>
+                      <a:lumOff val="60000"/>
+                    </a:schemeClr>
+                  </a:bgClr>
+                </a:pattFill>
+                <a:effectLst>
+                  <a:innerShdw blurRad="177800">
+                    <a:schemeClr val="accent3">
+                      <a:lumMod val="50000"/>
+                    </a:schemeClr>
+                  </a:innerShdw>
+                </a:effectLst>
+              </a:endParaRPr>
+            </a:p>
+          </p:txBody>
+        </p:sp>
+      </p:grpSp>
+    </p:spTree>
+  </p:cSld>
+  <p:clrMapOvr>
+    <a:masterClrMapping/>
+  </p:clrMapOvr>
+</p:sld>
+</file>
+
 <file path=ppt/slides/slide2.xml><?xml version="1.0" encoding="utf-8"?>
 <p:sld xmlns:a="http://schemas.openxmlformats.org/drawingml/2006/main" xmlns:r="http://schemas.openxmlformats.org/officeDocument/2006/relationships" xmlns:p="http://schemas.openxmlformats.org/presentationml/2006/main">
   <p:cSld>
@@ -6255,7 +6881,6 @@
               <a:pPr algn="ctr"/>
               <a:r>
                 <a:rPr lang="zh-CN" altLang="en-US" sz="4800" b="1">
-                  <a:ln/>
                   <a:solidFill>
                     <a:schemeClr val="bg2"/>
                   </a:solidFill>
@@ -6271,7 +6896,6 @@
               </a:r>
               <a:r>
                 <a:rPr lang="en-US" altLang="zh-CN" sz="4800" b="1">
-                  <a:ln/>
                   <a:solidFill>
                     <a:schemeClr val="bg2"/>
                   </a:solidFill>
@@ -6287,7 +6911,6 @@
               </a:r>
               <a:r>
                 <a:rPr lang="zh-CN" altLang="en-US" sz="4800" b="1">
-                  <a:ln/>
                   <a:solidFill>
                     <a:schemeClr val="bg2"/>
                   </a:solidFill>
@@ -6303,7 +6926,6 @@
               </a:r>
               <a:r>
                 <a:rPr lang="en-US" altLang="zh-CN" sz="4800" b="1">
-                  <a:ln/>
                   <a:solidFill>
                     <a:schemeClr val="bg2"/>
                   </a:solidFill>
@@ -6319,7 +6941,6 @@
               </a:r>
               <a:r>
                 <a:rPr lang="zh-CN" altLang="en-US" sz="4800" b="1">
-                  <a:ln/>
                   <a:solidFill>
                     <a:schemeClr val="bg2"/>
                   </a:solidFill>
@@ -6335,7 +6956,6 @@
               </a:r>
               <a:r>
                 <a:rPr lang="en-US" altLang="zh-CN" sz="4800" b="1">
-                  <a:ln/>
                   <a:solidFill>
                     <a:schemeClr val="bg2"/>
                   </a:solidFill>
@@ -6351,7 +6971,6 @@
               </a:r>
               <a:r>
                 <a:rPr lang="zh-CN" altLang="en-US" sz="4800" b="1">
-                  <a:ln/>
                   <a:solidFill>
                     <a:schemeClr val="bg2"/>
                   </a:solidFill>
@@ -6367,7 +6986,6 @@
               </a:r>
               <a:r>
                 <a:rPr lang="en-US" altLang="zh-CN" sz="4800" b="1">
-                  <a:ln/>
                   <a:solidFill>
                     <a:schemeClr val="bg2"/>
                   </a:solidFill>
@@ -6383,7 +7001,6 @@
               </a:r>
               <a:r>
                 <a:rPr lang="zh-CN" altLang="en-US" sz="4800" b="1">
-                  <a:ln/>
                   <a:solidFill>
                     <a:schemeClr val="bg2"/>
                   </a:solidFill>
@@ -6398,7 +7015,6 @@
                 <a:t>度</a:t>
               </a:r>
               <a:endParaRPr lang="zh-CN" altLang="en-US" sz="4800" b="1">
-                <a:ln/>
                 <a:solidFill>
                   <a:schemeClr val="bg2"/>
                 </a:solidFill>
@@ -6415,7 +7031,6 @@
               <a:pPr algn="ctr"/>
               <a:r>
                 <a:rPr lang="zh-CN" altLang="en-US" sz="4800" b="1">
-                  <a:ln/>
                   <a:solidFill>
                     <a:schemeClr val="bg2"/>
                   </a:solidFill>
@@ -6430,7 +7045,6 @@
                 <a:t>与</a:t>
               </a:r>
               <a:endParaRPr lang="zh-CN" altLang="en-US" sz="4800" b="1">
-                <a:ln/>
                 <a:solidFill>
                   <a:schemeClr val="bg2"/>
                 </a:solidFill>
@@ -6447,7 +7061,6 @@
               <a:pPr algn="ctr"/>
               <a:r>
                 <a:rPr lang="zh-CN" altLang="en-US" sz="4800" b="1">
-                  <a:ln/>
                   <a:solidFill>
                     <a:schemeClr val="bg2"/>
                   </a:solidFill>
@@ -6463,7 +7076,6 @@
               </a:r>
               <a:r>
                 <a:rPr lang="en-US" altLang="zh-CN" sz="4800" b="1">
-                  <a:ln/>
                   <a:solidFill>
                     <a:schemeClr val="bg2"/>
                   </a:solidFill>
@@ -6479,7 +7091,6 @@
               </a:r>
               <a:r>
                 <a:rPr lang="zh-CN" altLang="en-US" sz="4800" b="1">
-                  <a:ln/>
                   <a:solidFill>
                     <a:schemeClr val="bg2"/>
                   </a:solidFill>
@@ -6495,7 +7106,6 @@
               </a:r>
               <a:r>
                 <a:rPr lang="en-US" altLang="zh-CN" sz="4800" b="1">
-                  <a:ln/>
                   <a:solidFill>
                     <a:schemeClr val="bg2"/>
                   </a:solidFill>
@@ -6511,7 +7121,6 @@
               </a:r>
               <a:r>
                 <a:rPr lang="zh-CN" altLang="en-US" sz="4800" b="1">
-                  <a:ln/>
                   <a:solidFill>
                     <a:schemeClr val="bg2"/>
                   </a:solidFill>
@@ -6527,7 +7136,6 @@
               </a:r>
               <a:r>
                 <a:rPr lang="en-US" altLang="zh-CN" sz="4800" b="1">
-                  <a:ln/>
                   <a:solidFill>
                     <a:schemeClr val="bg2"/>
                   </a:solidFill>
@@ -6543,7 +7151,6 @@
               </a:r>
               <a:r>
                 <a:rPr lang="zh-CN" altLang="en-US" sz="4800" b="1">
-                  <a:ln/>
                   <a:solidFill>
                     <a:schemeClr val="bg2"/>
                   </a:solidFill>
@@ -6559,7 +7166,6 @@
               </a:r>
               <a:r>
                 <a:rPr lang="en-US" altLang="zh-CN" sz="4800" b="1">
-                  <a:ln/>
                   <a:solidFill>
                     <a:schemeClr val="bg2"/>
                   </a:solidFill>
@@ -6575,7 +7181,6 @@
               </a:r>
               <a:r>
                 <a:rPr lang="zh-CN" altLang="en-US" sz="4800" b="1">
-                  <a:ln/>
                   <a:solidFill>
                     <a:schemeClr val="bg2"/>
                   </a:solidFill>
@@ -6590,7 +7195,6 @@
                 <a:t>度</a:t>
               </a:r>
               <a:endParaRPr lang="zh-CN" altLang="en-US" sz="4800" b="1">
-                <a:ln/>
                 <a:solidFill>
                   <a:schemeClr val="bg2"/>
                 </a:solidFill>
@@ -6651,6 +7255,12 @@
 </file>
 
 <file path=ppt/tags/tag7.xml><?xml version="1.0" encoding="utf-8"?>
+<p:tagLst xmlns:p="http://schemas.openxmlformats.org/presentationml/2006/main">
+  <p:tag name="KSO_WM_BEAUTIFY_FLAG" val=""/>
+</p:tagLst>
+</file>
+
+<file path=ppt/tags/tag8.xml><?xml version="1.0" encoding="utf-8"?>
 <p:tagLst xmlns:p="http://schemas.openxmlformats.org/presentationml/2006/main">
   <p:tag name="commondata" val="eyJoZGlkIjoiNmE4YWE2NWM2NjkyMzUxOGRkNDNkNjJlMmYxYjJlZDkifQ=="/>
 </p:tagLst>

</xml_diff>

<commit_message>
Site updated: 2023-10-27 15:41:01
</commit_message>
<xml_diff>
--- a/封面设计.pptx
+++ b/封面设计.pptx
@@ -16,11 +16,15 @@
     <p:sldId id="274" r:id="rId11"/>
     <p:sldId id="275" r:id="rId12"/>
     <p:sldId id="276" r:id="rId13"/>
+    <p:sldId id="277" r:id="rId14"/>
+    <p:sldId id="280" r:id="rId15"/>
+    <p:sldId id="278" r:id="rId16"/>
+    <p:sldId id="279" r:id="rId17"/>
   </p:sldIdLst>
   <p:sldSz cx="12192000" cy="6858000"/>
   <p:notesSz cx="6858000" cy="9144000"/>
   <p:custDataLst>
-    <p:tags r:id="rId17"/>
+    <p:tags r:id="rId21"/>
   </p:custDataLst>
   <p:defaultTextStyle>
     <a:defPPr>
@@ -3852,6 +3856,667 @@
 </p:sld>
 </file>
 
+<file path=ppt/slides/slide12.xml><?xml version="1.0" encoding="utf-8"?>
+<p:sld xmlns:a="http://schemas.openxmlformats.org/drawingml/2006/main" xmlns:r="http://schemas.openxmlformats.org/officeDocument/2006/relationships" xmlns:p="http://schemas.openxmlformats.org/presentationml/2006/main">
+  <p:cSld>
+    <p:spTree>
+      <p:nvGrpSpPr>
+        <p:cNvPr id="1" name=""/>
+        <p:cNvGrpSpPr/>
+        <p:nvPr/>
+      </p:nvGrpSpPr>
+      <p:grpSpPr/>
+      <p:grpSp>
+        <p:nvGrpSpPr>
+          <p:cNvPr id="9" name="组合 8"/>
+          <p:cNvGrpSpPr/>
+          <p:nvPr/>
+        </p:nvGrpSpPr>
+        <p:grpSpPr>
+          <a:xfrm>
+            <a:off x="1540510" y="517525"/>
+            <a:ext cx="8491855" cy="5481955"/>
+            <a:chOff x="2426" y="815"/>
+            <a:chExt cx="13373" cy="8633"/>
+          </a:xfrm>
+        </p:grpSpPr>
+        <p:sp>
+          <p:nvSpPr>
+            <p:cNvPr id="8" name="矩形 7"/>
+            <p:cNvSpPr/>
+            <p:nvPr/>
+          </p:nvSpPr>
+          <p:spPr>
+            <a:xfrm>
+              <a:off x="2426" y="815"/>
+              <a:ext cx="13373" cy="2132"/>
+            </a:xfrm>
+            <a:prstGeom prst="rect">
+              <a:avLst/>
+            </a:prstGeom>
+            <a:solidFill>
+              <a:schemeClr val="bg2"/>
+            </a:solidFill>
+            <a:ln>
+              <a:noFill/>
+            </a:ln>
+          </p:spPr>
+          <p:style>
+            <a:lnRef idx="2">
+              <a:schemeClr val="accent1">
+                <a:lumMod val="75000"/>
+              </a:schemeClr>
+            </a:lnRef>
+            <a:fillRef idx="1">
+              <a:schemeClr val="accent1"/>
+            </a:fillRef>
+            <a:effectRef idx="0">
+              <a:srgbClr val="FFFFFF"/>
+            </a:effectRef>
+            <a:fontRef idx="minor">
+              <a:schemeClr val="lt1"/>
+            </a:fontRef>
+          </p:style>
+          <p:txBody>
+            <a:bodyPr rtlCol="0" anchor="ctr"/>
+            <a:p>
+              <a:pPr algn="ctr"/>
+              <a:endParaRPr lang="zh-CN" altLang="en-US"/>
+            </a:p>
+          </p:txBody>
+        </p:sp>
+        <p:pic>
+          <p:nvPicPr>
+            <p:cNvPr id="5" name="图片 4"/>
+            <p:cNvPicPr>
+              <a:picLocks noChangeAspect="1"/>
+            </p:cNvPicPr>
+            <p:nvPr>
+              <p:custDataLst>
+                <p:tags r:id="rId1"/>
+              </p:custDataLst>
+            </p:nvPr>
+          </p:nvPicPr>
+          <p:blipFill>
+            <a:blip r:embed="rId2"/>
+            <a:stretch>
+              <a:fillRect/>
+            </a:stretch>
+          </p:blipFill>
+          <p:spPr>
+            <a:xfrm>
+              <a:off x="2427" y="2748"/>
+              <a:ext cx="13372" cy="6701"/>
+            </a:xfrm>
+            <a:prstGeom prst="rect">
+              <a:avLst/>
+            </a:prstGeom>
+          </p:spPr>
+        </p:pic>
+        <p:sp>
+          <p:nvSpPr>
+            <p:cNvPr id="6" name="矩形 5"/>
+            <p:cNvSpPr/>
+            <p:nvPr/>
+          </p:nvSpPr>
+          <p:spPr>
+            <a:xfrm>
+              <a:off x="5369" y="1041"/>
+              <a:ext cx="7488" cy="1598"/>
+            </a:xfrm>
+            <a:prstGeom prst="rect">
+              <a:avLst/>
+            </a:prstGeom>
+            <a:noFill/>
+            <a:ln>
+              <a:noFill/>
+            </a:ln>
+          </p:spPr>
+          <p:txBody>
+            <a:bodyPr wrap="none" rtlCol="0" anchor="t">
+              <a:spAutoFit/>
+            </a:bodyPr>
+            <a:p>
+              <a:pPr algn="ctr"/>
+              <a:r>
+                <a:rPr lang="zh-CN" altLang="en-US" sz="6000" b="1">
+                  <a:ln w="9525">
+                    <a:solidFill>
+                      <a:schemeClr val="bg1"/>
+                    </a:solidFill>
+                    <a:prstDash val="solid"/>
+                  </a:ln>
+                  <a:solidFill>
+                    <a:schemeClr val="tx1"/>
+                  </a:solidFill>
+                  <a:effectLst>
+                    <a:outerShdw blurRad="12700" dist="38100" dir="2700000" algn="tl" rotWithShape="0">
+                      <a:schemeClr val="bg1">
+                        <a:lumMod val="50000"/>
+                      </a:schemeClr>
+                    </a:outerShdw>
+                  </a:effectLst>
+                </a:rPr>
+                <a:t>前端学习路线</a:t>
+              </a:r>
+              <a:endParaRPr lang="zh-CN" altLang="en-US" sz="6000" b="1">
+                <a:ln w="9525">
+                  <a:solidFill>
+                    <a:schemeClr val="bg1"/>
+                  </a:solidFill>
+                  <a:prstDash val="solid"/>
+                </a:ln>
+                <a:solidFill>
+                  <a:schemeClr val="tx1"/>
+                </a:solidFill>
+                <a:effectLst>
+                  <a:outerShdw blurRad="12700" dist="38100" dir="2700000" algn="tl" rotWithShape="0">
+                    <a:schemeClr val="bg1">
+                      <a:lumMod val="50000"/>
+                    </a:schemeClr>
+                  </a:outerShdw>
+                </a:effectLst>
+              </a:endParaRPr>
+            </a:p>
+          </p:txBody>
+        </p:sp>
+      </p:grpSp>
+    </p:spTree>
+  </p:cSld>
+  <p:clrMapOvr>
+    <a:masterClrMapping/>
+  </p:clrMapOvr>
+</p:sld>
+</file>
+
+<file path=ppt/slides/slide13.xml><?xml version="1.0" encoding="utf-8"?>
+<p:sld xmlns:a="http://schemas.openxmlformats.org/drawingml/2006/main" xmlns:r="http://schemas.openxmlformats.org/officeDocument/2006/relationships" xmlns:p="http://schemas.openxmlformats.org/presentationml/2006/main">
+  <p:cSld>
+    <p:spTree>
+      <p:nvGrpSpPr>
+        <p:cNvPr id="1" name=""/>
+        <p:cNvGrpSpPr/>
+        <p:nvPr/>
+      </p:nvGrpSpPr>
+      <p:grpSpPr/>
+      <p:grpSp>
+        <p:nvGrpSpPr>
+          <p:cNvPr id="4" name="组合 3"/>
+          <p:cNvGrpSpPr/>
+          <p:nvPr/>
+        </p:nvGrpSpPr>
+        <p:grpSpPr>
+          <a:xfrm>
+            <a:off x="2844800" y="177800"/>
+            <a:ext cx="6502400" cy="6329680"/>
+            <a:chOff x="4480" y="280"/>
+            <a:chExt cx="10240" cy="9968"/>
+          </a:xfrm>
+        </p:grpSpPr>
+        <p:pic>
+          <p:nvPicPr>
+            <p:cNvPr id="2" name="图片 1" descr="VCG41N1129893925"/>
+            <p:cNvPicPr>
+              <a:picLocks noChangeAspect="1"/>
+            </p:cNvPicPr>
+            <p:nvPr/>
+          </p:nvPicPr>
+          <p:blipFill>
+            <a:blip r:embed="rId1"/>
+            <a:srcRect b="2656"/>
+            <a:stretch>
+              <a:fillRect/>
+            </a:stretch>
+          </p:blipFill>
+          <p:spPr>
+            <a:xfrm>
+              <a:off x="4480" y="280"/>
+              <a:ext cx="10240" cy="9968"/>
+            </a:xfrm>
+            <a:prstGeom prst="rect">
+              <a:avLst/>
+            </a:prstGeom>
+          </p:spPr>
+        </p:pic>
+        <p:sp>
+          <p:nvSpPr>
+            <p:cNvPr id="3" name="矩形 2"/>
+            <p:cNvSpPr/>
+            <p:nvPr/>
+          </p:nvSpPr>
+          <p:spPr>
+            <a:xfrm>
+              <a:off x="5000" y="6894"/>
+              <a:ext cx="3488" cy="3052"/>
+            </a:xfrm>
+            <a:prstGeom prst="rect">
+              <a:avLst/>
+            </a:prstGeom>
+            <a:noFill/>
+            <a:ln>
+              <a:noFill/>
+            </a:ln>
+          </p:spPr>
+          <p:txBody>
+            <a:bodyPr wrap="none" rtlCol="0" anchor="t">
+              <a:spAutoFit/>
+              <a:scene3d>
+                <a:camera prst="orthographicFront"/>
+                <a:lightRig rig="threePt" dir="t"/>
+              </a:scene3d>
+            </a:bodyPr>
+            <a:p>
+              <a:pPr indent="0" algn="l" fontAlgn="auto">
+                <a:lnSpc>
+                  <a:spcPct val="150000"/>
+                </a:lnSpc>
+              </a:pPr>
+              <a:r>
+                <a:rPr lang="zh-CN" altLang="en-US" sz="4000" b="1">
+                  <a:solidFill>
+                    <a:schemeClr val="bg2"/>
+                  </a:solidFill>
+                  <a:effectLst>
+                    <a:innerShdw blurRad="63500" dist="50800" dir="13500000">
+                      <a:srgbClr val="000000">
+                        <a:alpha val="50000"/>
+                      </a:srgbClr>
+                    </a:innerShdw>
+                  </a:effectLst>
+                </a:rPr>
+                <a:t>前端</a:t>
+              </a:r>
+              <a:endParaRPr lang="zh-CN" altLang="en-US" sz="4000" b="1">
+                <a:solidFill>
+                  <a:schemeClr val="bg2"/>
+                </a:solidFill>
+                <a:effectLst>
+                  <a:innerShdw blurRad="63500" dist="50800" dir="13500000">
+                    <a:srgbClr val="000000">
+                      <a:alpha val="50000"/>
+                    </a:srgbClr>
+                  </a:innerShdw>
+                </a:effectLst>
+              </a:endParaRPr>
+            </a:p>
+            <a:p>
+              <a:pPr indent="0" algn="l" fontAlgn="auto">
+                <a:lnSpc>
+                  <a:spcPct val="150000"/>
+                </a:lnSpc>
+              </a:pPr>
+              <a:r>
+                <a:rPr lang="zh-CN" altLang="en-US" sz="4000" b="1">
+                  <a:solidFill>
+                    <a:schemeClr val="bg2"/>
+                  </a:solidFill>
+                  <a:effectLst>
+                    <a:innerShdw blurRad="63500" dist="50800" dir="13500000">
+                      <a:srgbClr val="000000">
+                        <a:alpha val="50000"/>
+                      </a:srgbClr>
+                    </a:innerShdw>
+                  </a:effectLst>
+                </a:rPr>
+                <a:t>技术社区</a:t>
+              </a:r>
+              <a:endParaRPr lang="zh-CN" altLang="en-US" sz="4000" b="1">
+                <a:solidFill>
+                  <a:schemeClr val="bg2"/>
+                </a:solidFill>
+                <a:effectLst>
+                  <a:innerShdw blurRad="63500" dist="50800" dir="13500000">
+                    <a:srgbClr val="000000">
+                      <a:alpha val="50000"/>
+                    </a:srgbClr>
+                  </a:innerShdw>
+                </a:effectLst>
+              </a:endParaRPr>
+            </a:p>
+          </p:txBody>
+        </p:sp>
+      </p:grpSp>
+    </p:spTree>
+  </p:cSld>
+  <p:clrMapOvr>
+    <a:masterClrMapping/>
+  </p:clrMapOvr>
+</p:sld>
+</file>
+
+<file path=ppt/slides/slide14.xml><?xml version="1.0" encoding="utf-8"?>
+<p:sld xmlns:a="http://schemas.openxmlformats.org/drawingml/2006/main" xmlns:r="http://schemas.openxmlformats.org/officeDocument/2006/relationships" xmlns:p="http://schemas.openxmlformats.org/presentationml/2006/main">
+  <p:cSld>
+    <p:spTree>
+      <p:nvGrpSpPr>
+        <p:cNvPr id="1" name=""/>
+        <p:cNvGrpSpPr/>
+        <p:nvPr/>
+      </p:nvGrpSpPr>
+      <p:grpSpPr/>
+      <p:grpSp>
+        <p:nvGrpSpPr>
+          <p:cNvPr id="7" name="组合 6"/>
+          <p:cNvGrpSpPr/>
+          <p:nvPr/>
+        </p:nvGrpSpPr>
+        <p:grpSpPr>
+          <a:xfrm>
+            <a:off x="1562735" y="863600"/>
+            <a:ext cx="8023225" cy="5131435"/>
+            <a:chOff x="2461" y="1360"/>
+            <a:chExt cx="12635" cy="8081"/>
+          </a:xfrm>
+        </p:grpSpPr>
+        <p:pic>
+          <p:nvPicPr>
+            <p:cNvPr id="2" name="图片 1" descr="VCG211237675331"/>
+            <p:cNvPicPr>
+              <a:picLocks noChangeAspect="1"/>
+            </p:cNvPicPr>
+            <p:nvPr/>
+          </p:nvPicPr>
+          <p:blipFill>
+            <a:blip r:embed="rId1"/>
+            <a:srcRect b="4114"/>
+            <a:stretch>
+              <a:fillRect/>
+            </a:stretch>
+          </p:blipFill>
+          <p:spPr>
+            <a:xfrm>
+              <a:off x="2461" y="1360"/>
+              <a:ext cx="12635" cy="8081"/>
+            </a:xfrm>
+            <a:prstGeom prst="rect">
+              <a:avLst/>
+            </a:prstGeom>
+          </p:spPr>
+        </p:pic>
+        <p:sp>
+          <p:nvSpPr>
+            <p:cNvPr id="4" name="矩形 3"/>
+            <p:cNvSpPr/>
+            <p:nvPr/>
+          </p:nvSpPr>
+          <p:spPr>
+            <a:xfrm>
+              <a:off x="6233" y="8143"/>
+              <a:ext cx="5832" cy="1298"/>
+            </a:xfrm>
+            <a:prstGeom prst="rect">
+              <a:avLst/>
+            </a:prstGeom>
+            <a:solidFill>
+              <a:schemeClr val="bg2"/>
+            </a:solidFill>
+            <a:ln>
+              <a:noFill/>
+            </a:ln>
+          </p:spPr>
+          <p:style>
+            <a:lnRef idx="2">
+              <a:schemeClr val="accent1">
+                <a:lumMod val="75000"/>
+              </a:schemeClr>
+            </a:lnRef>
+            <a:fillRef idx="1">
+              <a:schemeClr val="accent1"/>
+            </a:fillRef>
+            <a:effectRef idx="0">
+              <a:srgbClr val="FFFFFF"/>
+            </a:effectRef>
+            <a:fontRef idx="minor">
+              <a:schemeClr val="lt1"/>
+            </a:fontRef>
+          </p:style>
+          <p:txBody>
+            <a:bodyPr rtlCol="0" anchor="ctr"/>
+            <a:p>
+              <a:pPr algn="ctr"/>
+              <a:endParaRPr lang="zh-CN" altLang="en-US"/>
+            </a:p>
+          </p:txBody>
+        </p:sp>
+        <p:sp>
+          <p:nvSpPr>
+            <p:cNvPr id="3" name="矩形 2"/>
+            <p:cNvSpPr/>
+            <p:nvPr/>
+          </p:nvSpPr>
+          <p:spPr>
+            <a:xfrm>
+              <a:off x="6413" y="8328"/>
+              <a:ext cx="5094" cy="1113"/>
+            </a:xfrm>
+            <a:prstGeom prst="rect">
+              <a:avLst/>
+            </a:prstGeom>
+            <a:noFill/>
+            <a:ln>
+              <a:noFill/>
+            </a:ln>
+          </p:spPr>
+          <p:txBody>
+            <a:bodyPr wrap="none" rtlCol="0" anchor="t">
+              <a:spAutoFit/>
+            </a:bodyPr>
+            <a:p>
+              <a:pPr algn="ctr"/>
+              <a:r>
+                <a:rPr lang="zh-CN" altLang="en-US" sz="4000" b="1">
+                  <a:ln w="9525">
+                    <a:solidFill>
+                      <a:schemeClr val="bg1"/>
+                    </a:solidFill>
+                    <a:prstDash val="solid"/>
+                  </a:ln>
+                  <a:solidFill>
+                    <a:schemeClr val="tx1"/>
+                  </a:solidFill>
+                  <a:effectLst>
+                    <a:outerShdw blurRad="12700" dist="38100" dir="2700000" algn="tl" rotWithShape="0">
+                      <a:schemeClr val="bg1">
+                        <a:lumMod val="50000"/>
+                      </a:schemeClr>
+                    </a:outerShdw>
+                  </a:effectLst>
+                  <a:latin typeface="华文楷体" panose="02010600040101010101" charset="-122"/>
+                  <a:ea typeface="华文楷体" panose="02010600040101010101" charset="-122"/>
+                </a:rPr>
+                <a:t>前端开发竞赛</a:t>
+              </a:r>
+              <a:endParaRPr lang="zh-CN" altLang="en-US" sz="4000" b="1">
+                <a:ln w="9525">
+                  <a:solidFill>
+                    <a:schemeClr val="bg1"/>
+                  </a:solidFill>
+                  <a:prstDash val="solid"/>
+                </a:ln>
+                <a:solidFill>
+                  <a:schemeClr val="tx1"/>
+                </a:solidFill>
+                <a:effectLst>
+                  <a:outerShdw blurRad="12700" dist="38100" dir="2700000" algn="tl" rotWithShape="0">
+                    <a:schemeClr val="bg1">
+                      <a:lumMod val="50000"/>
+                    </a:schemeClr>
+                  </a:outerShdw>
+                </a:effectLst>
+                <a:latin typeface="华文楷体" panose="02010600040101010101" charset="-122"/>
+                <a:ea typeface="华文楷体" panose="02010600040101010101" charset="-122"/>
+              </a:endParaRPr>
+            </a:p>
+          </p:txBody>
+        </p:sp>
+      </p:grpSp>
+    </p:spTree>
+  </p:cSld>
+  <p:clrMapOvr>
+    <a:masterClrMapping/>
+  </p:clrMapOvr>
+</p:sld>
+</file>
+
+<file path=ppt/slides/slide15.xml><?xml version="1.0" encoding="utf-8"?>
+<p:sld xmlns:a="http://schemas.openxmlformats.org/drawingml/2006/main" xmlns:r="http://schemas.openxmlformats.org/officeDocument/2006/relationships" xmlns:p="http://schemas.openxmlformats.org/presentationml/2006/main">
+  <p:cSld>
+    <p:spTree>
+      <p:nvGrpSpPr>
+        <p:cNvPr id="1" name=""/>
+        <p:cNvGrpSpPr/>
+        <p:nvPr/>
+      </p:nvGrpSpPr>
+      <p:grpSpPr/>
+      <p:grpSp>
+        <p:nvGrpSpPr>
+          <p:cNvPr id="9" name="组合 8"/>
+          <p:cNvGrpSpPr/>
+          <p:nvPr/>
+        </p:nvGrpSpPr>
+        <p:grpSpPr>
+          <a:xfrm>
+            <a:off x="1749425" y="622935"/>
+            <a:ext cx="8296910" cy="5318760"/>
+            <a:chOff x="2755" y="981"/>
+            <a:chExt cx="13066" cy="8376"/>
+          </a:xfrm>
+        </p:grpSpPr>
+        <p:pic>
+          <p:nvPicPr>
+            <p:cNvPr id="5" name="图片 4" descr="VCG211242730202"/>
+            <p:cNvPicPr>
+              <a:picLocks noChangeAspect="1"/>
+            </p:cNvPicPr>
+            <p:nvPr/>
+          </p:nvPicPr>
+          <p:blipFill>
+            <a:blip r:embed="rId1"/>
+            <a:srcRect b="3895"/>
+            <a:stretch>
+              <a:fillRect/>
+            </a:stretch>
+          </p:blipFill>
+          <p:spPr>
+            <a:xfrm>
+              <a:off x="2755" y="981"/>
+              <a:ext cx="13066" cy="8376"/>
+            </a:xfrm>
+            <a:prstGeom prst="rect">
+              <a:avLst/>
+            </a:prstGeom>
+          </p:spPr>
+        </p:pic>
+        <p:sp>
+          <p:nvSpPr>
+            <p:cNvPr id="6" name="矩形 5"/>
+            <p:cNvSpPr/>
+            <p:nvPr/>
+          </p:nvSpPr>
+          <p:spPr>
+            <a:xfrm>
+              <a:off x="6757" y="7183"/>
+              <a:ext cx="5113" cy="1895"/>
+            </a:xfrm>
+            <a:prstGeom prst="rect">
+              <a:avLst/>
+            </a:prstGeom>
+            <a:solidFill>
+              <a:schemeClr val="bg2"/>
+            </a:solidFill>
+            <a:ln>
+              <a:noFill/>
+            </a:ln>
+          </p:spPr>
+          <p:style>
+            <a:lnRef idx="2">
+              <a:schemeClr val="accent1">
+                <a:lumMod val="75000"/>
+              </a:schemeClr>
+            </a:lnRef>
+            <a:fillRef idx="1">
+              <a:schemeClr val="accent1"/>
+            </a:fillRef>
+            <a:effectRef idx="0">
+              <a:srgbClr val="FFFFFF"/>
+            </a:effectRef>
+            <a:fontRef idx="minor">
+              <a:schemeClr val="lt1"/>
+            </a:fontRef>
+          </p:style>
+          <p:txBody>
+            <a:bodyPr rtlCol="0" anchor="ctr"/>
+            <a:p>
+              <a:pPr algn="ctr"/>
+              <a:endParaRPr lang="zh-CN" altLang="en-US"/>
+            </a:p>
+          </p:txBody>
+        </p:sp>
+        <p:sp>
+          <p:nvSpPr>
+            <p:cNvPr id="8" name="矩形 7"/>
+            <p:cNvSpPr/>
+            <p:nvPr/>
+          </p:nvSpPr>
+          <p:spPr>
+            <a:xfrm>
+              <a:off x="5562" y="7405"/>
+              <a:ext cx="7883" cy="1452"/>
+            </a:xfrm>
+            <a:prstGeom prst="rect">
+              <a:avLst/>
+            </a:prstGeom>
+            <a:noFill/>
+            <a:ln>
+              <a:noFill/>
+            </a:ln>
+          </p:spPr>
+          <p:txBody>
+            <a:bodyPr wrap="none" rtlCol="0" anchor="t">
+              <a:spAutoFit/>
+              <a:scene3d>
+                <a:camera prst="orthographicFront"/>
+                <a:lightRig rig="soft" dir="t">
+                  <a:rot lat="0" lon="0" rev="15600000"/>
+                </a:lightRig>
+              </a:scene3d>
+              <a:sp3d extrusionH="57150" prstMaterial="softEdge">
+                <a:bevelT w="25400" h="38100"/>
+              </a:sp3d>
+            </a:bodyPr>
+            <a:p>
+              <a:pPr algn="ctr"/>
+              <a:r>
+                <a:rPr lang="zh-CN" altLang="en-US" sz="5400" b="1">
+                  <a:solidFill>
+                    <a:srgbClr val="799139"/>
+                  </a:solidFill>
+                  <a:effectLst/>
+                  <a:latin typeface="方正舒体" panose="02010601030101010101" charset="-122"/>
+                  <a:ea typeface="方正舒体" panose="02010601030101010101" charset="-122"/>
+                </a:rPr>
+                <a:t>前端经典面试题</a:t>
+              </a:r>
+              <a:endParaRPr lang="zh-CN" altLang="en-US" sz="5400" b="1">
+                <a:solidFill>
+                  <a:srgbClr val="799139"/>
+                </a:solidFill>
+                <a:effectLst/>
+                <a:latin typeface="方正舒体" panose="02010601030101010101" charset="-122"/>
+                <a:ea typeface="方正舒体" panose="02010601030101010101" charset="-122"/>
+              </a:endParaRPr>
+            </a:p>
+          </p:txBody>
+        </p:sp>
+      </p:grpSp>
+    </p:spTree>
+  </p:cSld>
+  <p:clrMapOvr>
+    <a:masterClrMapping/>
+  </p:clrMapOvr>
+</p:sld>
+</file>
+
 <file path=ppt/slides/slide2.xml><?xml version="1.0" encoding="utf-8"?>
 <p:sld xmlns:a="http://schemas.openxmlformats.org/drawingml/2006/main" xmlns:r="http://schemas.openxmlformats.org/officeDocument/2006/relationships" xmlns:p="http://schemas.openxmlformats.org/presentationml/2006/main">
   <p:cSld>
@@ -7261,6 +7926,12 @@
 </file>
 
 <file path=ppt/tags/tag8.xml><?xml version="1.0" encoding="utf-8"?>
+<p:tagLst xmlns:p="http://schemas.openxmlformats.org/presentationml/2006/main">
+  <p:tag name="KSO_WM_BEAUTIFY_FLAG" val=""/>
+</p:tagLst>
+</file>
+
+<file path=ppt/tags/tag9.xml><?xml version="1.0" encoding="utf-8"?>
 <p:tagLst xmlns:p="http://schemas.openxmlformats.org/presentationml/2006/main">
   <p:tag name="commondata" val="eyJoZGlkIjoiNmE4YWE2NWM2NjkyMzUxOGRkNDNkNjJlMmYxYjJlZDkifQ=="/>
 </p:tagLst>

</xml_diff>

<commit_message>
Site updated: 2023-10-27 22:48:57
</commit_message>
<xml_diff>
--- a/封面设计.pptx
+++ b/封面设计.pptx
@@ -4047,10 +4047,10 @@
         </p:nvGrpSpPr>
         <p:grpSpPr>
           <a:xfrm>
-            <a:off x="2844800" y="177800"/>
-            <a:ext cx="6502400" cy="6329680"/>
-            <a:chOff x="4480" y="280"/>
-            <a:chExt cx="10240" cy="9968"/>
+            <a:off x="2977515" y="527050"/>
+            <a:ext cx="6502400" cy="5361305"/>
+            <a:chOff x="4480" y="941"/>
+            <a:chExt cx="10240" cy="8443"/>
           </a:xfrm>
         </p:grpSpPr>
         <p:pic>
@@ -4063,15 +4063,15 @@
           </p:nvPicPr>
           <p:blipFill>
             <a:blip r:embed="rId1"/>
-            <a:srcRect b="2656"/>
+            <a:srcRect t="6455" b="11094"/>
             <a:stretch>
               <a:fillRect/>
             </a:stretch>
           </p:blipFill>
           <p:spPr>
             <a:xfrm>
-              <a:off x="4480" y="280"/>
-              <a:ext cx="10240" cy="9968"/>
+              <a:off x="4480" y="941"/>
+              <a:ext cx="10240" cy="8443"/>
             </a:xfrm>
             <a:prstGeom prst="rect">
               <a:avLst/>
@@ -4086,8 +4086,8 @@
           </p:nvSpPr>
           <p:spPr>
             <a:xfrm>
-              <a:off x="5000" y="6894"/>
-              <a:ext cx="3488" cy="3052"/>
+              <a:off x="5041" y="6072"/>
+              <a:ext cx="2848" cy="2470"/>
             </a:xfrm>
             <a:prstGeom prst="rect">
               <a:avLst/>
@@ -4112,7 +4112,7 @@
                 </a:lnSpc>
               </a:pPr>
               <a:r>
-                <a:rPr lang="zh-CN" altLang="en-US" sz="4000" b="1">
+                <a:rPr lang="zh-CN" altLang="en-US" sz="3200" b="1">
                   <a:solidFill>
                     <a:schemeClr val="bg2"/>
                   </a:solidFill>
@@ -4126,7 +4126,7 @@
                 </a:rPr>
                 <a:t>前端</a:t>
               </a:r>
-              <a:endParaRPr lang="zh-CN" altLang="en-US" sz="4000" b="1">
+              <a:endParaRPr lang="zh-CN" altLang="en-US" sz="3200" b="1">
                 <a:solidFill>
                   <a:schemeClr val="bg2"/>
                 </a:solidFill>
@@ -4146,7 +4146,7 @@
                 </a:lnSpc>
               </a:pPr>
               <a:r>
-                <a:rPr lang="zh-CN" altLang="en-US" sz="4000" b="1">
+                <a:rPr lang="zh-CN" altLang="en-US" sz="3200" b="1">
                   <a:solidFill>
                     <a:schemeClr val="bg2"/>
                   </a:solidFill>
@@ -4160,7 +4160,7 @@
                 </a:rPr>
                 <a:t>技术社区</a:t>
               </a:r>
-              <a:endParaRPr lang="zh-CN" altLang="en-US" sz="4000" b="1">
+              <a:endParaRPr lang="zh-CN" altLang="en-US" sz="3200" b="1">
                 <a:solidFill>
                   <a:schemeClr val="bg2"/>
                 </a:solidFill>
@@ -4202,10 +4202,10 @@
         </p:nvGrpSpPr>
         <p:grpSpPr>
           <a:xfrm>
-            <a:off x="1562735" y="863600"/>
-            <a:ext cx="8023225" cy="5131435"/>
-            <a:chOff x="2461" y="1360"/>
-            <a:chExt cx="12635" cy="8081"/>
+            <a:off x="1609725" y="880745"/>
+            <a:ext cx="7954010" cy="5114290"/>
+            <a:chOff x="2535" y="1387"/>
+            <a:chExt cx="12526" cy="8054"/>
           </a:xfrm>
         </p:grpSpPr>
         <p:pic>
@@ -4218,15 +4218,15 @@
           </p:nvPicPr>
           <p:blipFill>
             <a:blip r:embed="rId1"/>
-            <a:srcRect b="4114"/>
+            <a:srcRect l="586" t="321" r="277" b="4114"/>
             <a:stretch>
               <a:fillRect/>
             </a:stretch>
           </p:blipFill>
           <p:spPr>
             <a:xfrm>
-              <a:off x="2461" y="1360"/>
-              <a:ext cx="12635" cy="8081"/>
+              <a:off x="2535" y="1387"/>
+              <a:ext cx="12526" cy="8054"/>
             </a:xfrm>
             <a:prstGeom prst="rect">
               <a:avLst/>
@@ -4286,7 +4286,7 @@
           </p:nvSpPr>
           <p:spPr>
             <a:xfrm>
-              <a:off x="6413" y="8328"/>
+              <a:off x="6413" y="8143"/>
               <a:ext cx="5094" cy="1113"/>
             </a:xfrm>
             <a:prstGeom prst="rect">

</xml_diff>

<commit_message>
Site updated: 2023-11-11 00:32:04
</commit_message>
<xml_diff>
--- a/封面设计.pptx
+++ b/封面设计.pptx
@@ -4460,8 +4460,8 @@
           </p:nvSpPr>
           <p:spPr>
             <a:xfrm>
-              <a:off x="5562" y="7405"/>
-              <a:ext cx="7883" cy="1452"/>
+              <a:off x="6107" y="7183"/>
+              <a:ext cx="6798" cy="1452"/>
             </a:xfrm>
             <a:prstGeom prst="rect">
               <a:avLst/>
@@ -4495,7 +4495,18 @@
                   <a:latin typeface="方正舒体" panose="02010601030101010101" charset="-122"/>
                   <a:ea typeface="方正舒体" panose="02010601030101010101" charset="-122"/>
                 </a:rPr>
-                <a:t>前端经典面试题</a:t>
+                <a:t>前端面试</a:t>
+              </a:r>
+              <a:r>
+                <a:rPr lang="zh-CN" altLang="en-US" sz="5400" b="1">
+                  <a:solidFill>
+                    <a:srgbClr val="799139"/>
+                  </a:solidFill>
+                  <a:effectLst/>
+                  <a:latin typeface="方正舒体" panose="02010601030101010101" charset="-122"/>
+                  <a:ea typeface="方正舒体" panose="02010601030101010101" charset="-122"/>
+                </a:rPr>
+                <a:t>指南</a:t>
               </a:r>
               <a:endParaRPr lang="zh-CN" altLang="en-US" sz="5400" b="1">
                 <a:solidFill>

</xml_diff>

<commit_message>
Site updated: 2024-04-26 14:59:22
</commit_message>
<xml_diff>
--- a/封面设计.pptx
+++ b/封面设计.pptx
@@ -20,11 +20,12 @@
     <p:sldId id="280" r:id="rId15"/>
     <p:sldId id="278" r:id="rId16"/>
     <p:sldId id="279" r:id="rId17"/>
+    <p:sldId id="283" r:id="rId18"/>
   </p:sldIdLst>
   <p:sldSz cx="12192000" cy="6858000"/>
   <p:notesSz cx="6858000" cy="9144000"/>
   <p:custDataLst>
-    <p:tags r:id="rId21"/>
+    <p:tags r:id="rId22"/>
   </p:custDataLst>
   <p:defaultTextStyle>
     <a:defPPr>
@@ -4528,6 +4529,186 @@
 </p:sld>
 </file>
 
+<file path=ppt/slides/slide16.xml><?xml version="1.0" encoding="utf-8"?>
+<p:sld xmlns:a="http://schemas.openxmlformats.org/drawingml/2006/main" xmlns:r="http://schemas.openxmlformats.org/officeDocument/2006/relationships" xmlns:p="http://schemas.openxmlformats.org/presentationml/2006/main">
+  <p:cSld>
+    <p:spTree>
+      <p:nvGrpSpPr>
+        <p:cNvPr id="1" name=""/>
+        <p:cNvGrpSpPr/>
+        <p:nvPr/>
+      </p:nvGrpSpPr>
+      <p:grpSpPr/>
+      <p:sp>
+        <p:nvSpPr>
+          <p:cNvPr id="6" name="矩形 5"/>
+          <p:cNvSpPr/>
+          <p:nvPr/>
+        </p:nvSpPr>
+        <p:spPr>
+          <a:xfrm>
+            <a:off x="4290695" y="4561205"/>
+            <a:ext cx="3246755" cy="1203325"/>
+          </a:xfrm>
+          <a:prstGeom prst="rect">
+            <a:avLst/>
+          </a:prstGeom>
+          <a:solidFill>
+            <a:schemeClr val="bg2"/>
+          </a:solidFill>
+          <a:ln>
+            <a:noFill/>
+          </a:ln>
+        </p:spPr>
+        <p:style>
+          <a:lnRef idx="2">
+            <a:schemeClr val="accent1">
+              <a:lumMod val="75000"/>
+            </a:schemeClr>
+          </a:lnRef>
+          <a:fillRef idx="1">
+            <a:schemeClr val="accent1"/>
+          </a:fillRef>
+          <a:effectRef idx="0">
+            <a:srgbClr val="FFFFFF"/>
+          </a:effectRef>
+          <a:fontRef idx="minor">
+            <a:schemeClr val="lt1"/>
+          </a:fontRef>
+        </p:style>
+        <p:txBody>
+          <a:bodyPr rtlCol="0" anchor="ctr"/>
+          <a:p>
+            <a:pPr algn="ctr"/>
+            <a:endParaRPr lang="zh-CN" altLang="en-US"/>
+          </a:p>
+        </p:txBody>
+      </p:sp>
+      <p:grpSp>
+        <p:nvGrpSpPr>
+          <p:cNvPr id="3" name="组合 2"/>
+          <p:cNvGrpSpPr/>
+          <p:nvPr/>
+        </p:nvGrpSpPr>
+        <p:grpSpPr>
+          <a:xfrm>
+            <a:off x="2844800" y="1393190"/>
+            <a:ext cx="6502400" cy="4071620"/>
+            <a:chOff x="4480" y="593"/>
+            <a:chExt cx="10240" cy="6412"/>
+          </a:xfrm>
+        </p:grpSpPr>
+        <p:pic>
+          <p:nvPicPr>
+            <p:cNvPr id="2" name="图片 1" descr="VCG4197733799"/>
+            <p:cNvPicPr>
+              <a:picLocks noChangeAspect="1"/>
+            </p:cNvPicPr>
+            <p:nvPr/>
+          </p:nvPicPr>
+          <p:blipFill>
+            <a:blip r:embed="rId1"/>
+            <a:srcRect b="5691"/>
+            <a:stretch>
+              <a:fillRect/>
+            </a:stretch>
+          </p:blipFill>
+          <p:spPr>
+            <a:xfrm>
+              <a:off x="4480" y="593"/>
+              <a:ext cx="10240" cy="6413"/>
+            </a:xfrm>
+            <a:prstGeom prst="rect">
+              <a:avLst/>
+            </a:prstGeom>
+          </p:spPr>
+        </p:pic>
+        <p:sp>
+          <p:nvSpPr>
+            <p:cNvPr id="10" name="矩形 9"/>
+            <p:cNvSpPr/>
+            <p:nvPr>
+              <p:custDataLst>
+                <p:tags r:id="rId2"/>
+              </p:custDataLst>
+            </p:nvPr>
+          </p:nvSpPr>
+          <p:spPr>
+            <a:xfrm>
+              <a:off x="6307" y="3000"/>
+              <a:ext cx="6398" cy="1598"/>
+            </a:xfrm>
+            <a:prstGeom prst="rect">
+              <a:avLst/>
+            </a:prstGeom>
+            <a:noFill/>
+            <a:ln>
+              <a:noFill/>
+            </a:ln>
+          </p:spPr>
+          <p:txBody>
+            <a:bodyPr wrap="none" rtlCol="0" anchor="t">
+              <a:spAutoFit/>
+            </a:bodyPr>
+            <a:p>
+              <a:pPr algn="ctr"/>
+              <a:r>
+                <a:rPr lang="en-US" sz="6000" b="1">
+                  <a:ln w="13462">
+                    <a:solidFill>
+                      <a:schemeClr val="bg1"/>
+                    </a:solidFill>
+                    <a:prstDash val="solid"/>
+                  </a:ln>
+                  <a:solidFill>
+                    <a:schemeClr val="tx1">
+                      <a:lumMod val="85000"/>
+                      <a:lumOff val="15000"/>
+                    </a:schemeClr>
+                  </a:solidFill>
+                  <a:effectLst>
+                    <a:outerShdw dist="38100" dir="2700000" algn="bl" rotWithShape="0">
+                      <a:schemeClr val="accent5"/>
+                    </a:outerShdw>
+                  </a:effectLst>
+                  <a:latin typeface="+mj-ea"/>
+                  <a:ea typeface="+mj-ea"/>
+                </a:rPr>
+                <a:t>TypeScript</a:t>
+              </a:r>
+              <a:endParaRPr lang="en-US" sz="6000" b="1">
+                <a:ln w="13462">
+                  <a:solidFill>
+                    <a:schemeClr val="bg1"/>
+                  </a:solidFill>
+                  <a:prstDash val="solid"/>
+                </a:ln>
+                <a:solidFill>
+                  <a:schemeClr val="tx1">
+                    <a:lumMod val="85000"/>
+                    <a:lumOff val="15000"/>
+                  </a:schemeClr>
+                </a:solidFill>
+                <a:effectLst>
+                  <a:outerShdw dist="38100" dir="2700000" algn="bl" rotWithShape="0">
+                    <a:schemeClr val="accent5"/>
+                  </a:outerShdw>
+                </a:effectLst>
+                <a:latin typeface="+mj-ea"/>
+                <a:ea typeface="+mj-ea"/>
+              </a:endParaRPr>
+            </a:p>
+          </p:txBody>
+        </p:sp>
+      </p:grpSp>
+    </p:spTree>
+  </p:cSld>
+  <p:clrMapOvr>
+    <a:masterClrMapping/>
+  </p:clrMapOvr>
+</p:sld>
+</file>
+
 <file path=ppt/slides/slide2.xml><?xml version="1.0" encoding="utf-8"?>
 <p:sld xmlns:a="http://schemas.openxmlformats.org/drawingml/2006/main" xmlns:r="http://schemas.openxmlformats.org/officeDocument/2006/relationships" xmlns:p="http://schemas.openxmlformats.org/presentationml/2006/main">
   <p:cSld>
@@ -7900,6 +8081,12 @@
 </p:tagLst>
 </file>
 
+<file path=ppt/tags/tag10.xml><?xml version="1.0" encoding="utf-8"?>
+<p:tagLst xmlns:p="http://schemas.openxmlformats.org/presentationml/2006/main">
+  <p:tag name="commondata" val="eyJoZGlkIjoiNmE4YWE2NWM2NjkyMzUxOGRkNDNkNjJlMmYxYjJlZDkifQ=="/>
+</p:tagLst>
+</file>
+
 <file path=ppt/tags/tag2.xml><?xml version="1.0" encoding="utf-8"?>
 <p:tagLst xmlns:p="http://schemas.openxmlformats.org/presentationml/2006/main">
   <p:tag name="KSO_WM_BEAUTIFY_FLAG" val=""/>
@@ -7944,7 +8131,7 @@
 
 <file path=ppt/tags/tag9.xml><?xml version="1.0" encoding="utf-8"?>
 <p:tagLst xmlns:p="http://schemas.openxmlformats.org/presentationml/2006/main">
-  <p:tag name="commondata" val="eyJoZGlkIjoiNmE4YWE2NWM2NjkyMzUxOGRkNDNkNjJlMmYxYjJlZDkifQ=="/>
+  <p:tag name="KSO_WM_BEAUTIFY_FLAG" val=""/>
 </p:tagLst>
 </file>
 

</xml_diff>